<commit_message>
examples/dhcp: add dhcp example
</commit_message>
<xml_diff>
--- a/images/pictures.pptx
+++ b/images/pictures.pptx
@@ -5,12 +5,13 @@
     <p:sldMasterId id="2147483648" r:id="rId1"/>
   </p:sldMasterIdLst>
   <p:notesMasterIdLst>
-    <p:notesMasterId r:id="rId5"/>
+    <p:notesMasterId r:id="rId6"/>
   </p:notesMasterIdLst>
   <p:sldIdLst>
     <p:sldId id="259" r:id="rId2"/>
     <p:sldId id="257" r:id="rId3"/>
     <p:sldId id="258" r:id="rId4"/>
+    <p:sldId id="260" r:id="rId5"/>
   </p:sldIdLst>
   <p:sldSz cx="12192000" cy="6858000"/>
   <p:notesSz cx="6858000" cy="9144000"/>
@@ -199,7 +200,7 @@
           <a:p>
             <a:fld id="{EB9B39D7-1524-4A07-998B-9E55CB530253}" type="datetimeFigureOut">
               <a:rPr lang="en-US" smtClean="0"/>
-              <a:t>11/8/2016</a:t>
+              <a:t>1/27/2017</a:t>
             </a:fld>
             <a:endParaRPr lang="en-US"/>
           </a:p>
@@ -263,38 +264,37 @@
           <a:p>
             <a:pPr lvl="0"/>
             <a:r>
-              <a:rPr lang="en-US" smtClean="0"/>
+              <a:rPr lang="en-US"/>
               <a:t>Click to edit Master text styles</a:t>
             </a:r>
           </a:p>
           <a:p>
             <a:pPr lvl="1"/>
             <a:r>
-              <a:rPr lang="en-US" smtClean="0"/>
+              <a:rPr lang="en-US"/>
               <a:t>Second level</a:t>
             </a:r>
           </a:p>
           <a:p>
             <a:pPr lvl="2"/>
             <a:r>
-              <a:rPr lang="en-US" smtClean="0"/>
+              <a:rPr lang="en-US"/>
               <a:t>Third level</a:t>
             </a:r>
           </a:p>
           <a:p>
             <a:pPr lvl="3"/>
             <a:r>
-              <a:rPr lang="en-US" smtClean="0"/>
+              <a:rPr lang="en-US"/>
               <a:t>Fourth level</a:t>
             </a:r>
           </a:p>
           <a:p>
             <a:pPr lvl="4"/>
             <a:r>
-              <a:rPr lang="en-US" smtClean="0"/>
+              <a:rPr lang="en-US"/>
               <a:t>Fifth level</a:t>
             </a:r>
-            <a:endParaRPr lang="en-US"/>
           </a:p>
         </p:txBody>
       </p:sp>
@@ -512,10 +512,9 @@
           <a:lstStyle/>
           <a:p>
             <a:r>
-              <a:rPr lang="en-US" dirty="0" smtClean="0"/>
+              <a:rPr lang="en-US" dirty="0"/>
               <a:t>iovisor-ovn-overview.png</a:t>
             </a:r>
-            <a:endParaRPr lang="en-US" dirty="0"/>
           </a:p>
         </p:txBody>
       </p:sp>
@@ -617,10 +616,10 @@
               <a:defRPr/>
             </a:pPr>
             <a:r>
-              <a:rPr lang="en-US" smtClean="0"/>
+              <a:rPr lang="en-US"/>
               <a:t>iovisor-ovn-architecture.png</a:t>
             </a:r>
-            <a:endParaRPr lang="en-US" dirty="0" smtClean="0"/>
+            <a:endParaRPr lang="en-US" dirty="0"/>
           </a:p>
         </p:txBody>
       </p:sp>
@@ -702,10 +701,9 @@
           </a:lstStyle>
           <a:p>
             <a:r>
-              <a:rPr lang="en-US" smtClean="0"/>
+              <a:rPr lang="en-US"/>
               <a:t>Click to edit Master title style</a:t>
             </a:r>
-            <a:endParaRPr lang="en-US"/>
           </a:p>
         </p:txBody>
       </p:sp>
@@ -767,10 +765,9 @@
           </a:lstStyle>
           <a:p>
             <a:r>
-              <a:rPr lang="en-US" smtClean="0"/>
+              <a:rPr lang="en-US"/>
               <a:t>Click to edit Master subtitle style</a:t>
             </a:r>
-            <a:endParaRPr lang="en-US"/>
           </a:p>
         </p:txBody>
       </p:sp>
@@ -791,7 +788,7 @@
           <a:p>
             <a:fld id="{AB76F2E5-E013-4628-B8AF-912C7587513D}" type="datetimeFigureOut">
               <a:rPr lang="en-US" smtClean="0"/>
-              <a:t>11/8/2016</a:t>
+              <a:t>1/27/2017</a:t>
             </a:fld>
             <a:endParaRPr lang="en-US"/>
           </a:p>
@@ -885,10 +882,9 @@
           <a:lstStyle/>
           <a:p>
             <a:r>
-              <a:rPr lang="en-US" smtClean="0"/>
+              <a:rPr lang="en-US"/>
               <a:t>Click to edit Master title style</a:t>
             </a:r>
-            <a:endParaRPr lang="en-US"/>
           </a:p>
         </p:txBody>
       </p:sp>
@@ -909,38 +905,37 @@
           <a:p>
             <a:pPr lvl="0"/>
             <a:r>
-              <a:rPr lang="en-US" smtClean="0"/>
+              <a:rPr lang="en-US"/>
               <a:t>Click to edit Master text styles</a:t>
             </a:r>
           </a:p>
           <a:p>
             <a:pPr lvl="1"/>
             <a:r>
-              <a:rPr lang="en-US" smtClean="0"/>
+              <a:rPr lang="en-US"/>
               <a:t>Second level</a:t>
             </a:r>
           </a:p>
           <a:p>
             <a:pPr lvl="2"/>
             <a:r>
-              <a:rPr lang="en-US" smtClean="0"/>
+              <a:rPr lang="en-US"/>
               <a:t>Third level</a:t>
             </a:r>
           </a:p>
           <a:p>
             <a:pPr lvl="3"/>
             <a:r>
-              <a:rPr lang="en-US" smtClean="0"/>
+              <a:rPr lang="en-US"/>
               <a:t>Fourth level</a:t>
             </a:r>
           </a:p>
           <a:p>
             <a:pPr lvl="4"/>
             <a:r>
-              <a:rPr lang="en-US" smtClean="0"/>
+              <a:rPr lang="en-US"/>
               <a:t>Fifth level</a:t>
             </a:r>
-            <a:endParaRPr lang="en-US"/>
           </a:p>
         </p:txBody>
       </p:sp>
@@ -961,7 +956,7 @@
           <a:p>
             <a:fld id="{AB76F2E5-E013-4628-B8AF-912C7587513D}" type="datetimeFigureOut">
               <a:rPr lang="en-US" smtClean="0"/>
-              <a:t>11/8/2016</a:t>
+              <a:t>1/27/2017</a:t>
             </a:fld>
             <a:endParaRPr lang="en-US"/>
           </a:p>
@@ -1060,10 +1055,9 @@
           <a:lstStyle/>
           <a:p>
             <a:r>
-              <a:rPr lang="en-US" smtClean="0"/>
+              <a:rPr lang="en-US"/>
               <a:t>Click to edit Master title style</a:t>
             </a:r>
-            <a:endParaRPr lang="en-US"/>
           </a:p>
         </p:txBody>
       </p:sp>
@@ -1089,38 +1083,37 @@
           <a:p>
             <a:pPr lvl="0"/>
             <a:r>
-              <a:rPr lang="en-US" smtClean="0"/>
+              <a:rPr lang="en-US"/>
               <a:t>Click to edit Master text styles</a:t>
             </a:r>
           </a:p>
           <a:p>
             <a:pPr lvl="1"/>
             <a:r>
-              <a:rPr lang="en-US" smtClean="0"/>
+              <a:rPr lang="en-US"/>
               <a:t>Second level</a:t>
             </a:r>
           </a:p>
           <a:p>
             <a:pPr lvl="2"/>
             <a:r>
-              <a:rPr lang="en-US" smtClean="0"/>
+              <a:rPr lang="en-US"/>
               <a:t>Third level</a:t>
             </a:r>
           </a:p>
           <a:p>
             <a:pPr lvl="3"/>
             <a:r>
-              <a:rPr lang="en-US" smtClean="0"/>
+              <a:rPr lang="en-US"/>
               <a:t>Fourth level</a:t>
             </a:r>
           </a:p>
           <a:p>
             <a:pPr lvl="4"/>
             <a:r>
-              <a:rPr lang="en-US" smtClean="0"/>
+              <a:rPr lang="en-US"/>
               <a:t>Fifth level</a:t>
             </a:r>
-            <a:endParaRPr lang="en-US"/>
           </a:p>
         </p:txBody>
       </p:sp>
@@ -1141,7 +1134,7 @@
           <a:p>
             <a:fld id="{AB76F2E5-E013-4628-B8AF-912C7587513D}" type="datetimeFigureOut">
               <a:rPr lang="en-US" smtClean="0"/>
-              <a:t>11/8/2016</a:t>
+              <a:t>1/27/2017</a:t>
             </a:fld>
             <a:endParaRPr lang="en-US"/>
           </a:p>
@@ -1235,10 +1228,9 @@
           <a:lstStyle/>
           <a:p>
             <a:r>
-              <a:rPr lang="en-US" smtClean="0"/>
+              <a:rPr lang="en-US"/>
               <a:t>Click to edit Master title style</a:t>
             </a:r>
-            <a:endParaRPr lang="en-US"/>
           </a:p>
         </p:txBody>
       </p:sp>
@@ -1259,38 +1251,37 @@
           <a:p>
             <a:pPr lvl="0"/>
             <a:r>
-              <a:rPr lang="en-US" smtClean="0"/>
+              <a:rPr lang="en-US"/>
               <a:t>Click to edit Master text styles</a:t>
             </a:r>
           </a:p>
           <a:p>
             <a:pPr lvl="1"/>
             <a:r>
-              <a:rPr lang="en-US" smtClean="0"/>
+              <a:rPr lang="en-US"/>
               <a:t>Second level</a:t>
             </a:r>
           </a:p>
           <a:p>
             <a:pPr lvl="2"/>
             <a:r>
-              <a:rPr lang="en-US" smtClean="0"/>
+              <a:rPr lang="en-US"/>
               <a:t>Third level</a:t>
             </a:r>
           </a:p>
           <a:p>
             <a:pPr lvl="3"/>
             <a:r>
-              <a:rPr lang="en-US" smtClean="0"/>
+              <a:rPr lang="en-US"/>
               <a:t>Fourth level</a:t>
             </a:r>
           </a:p>
           <a:p>
             <a:pPr lvl="4"/>
             <a:r>
-              <a:rPr lang="en-US" smtClean="0"/>
+              <a:rPr lang="en-US"/>
               <a:t>Fifth level</a:t>
             </a:r>
-            <a:endParaRPr lang="en-US"/>
           </a:p>
         </p:txBody>
       </p:sp>
@@ -1311,7 +1302,7 @@
           <a:p>
             <a:fld id="{AB76F2E5-E013-4628-B8AF-912C7587513D}" type="datetimeFigureOut">
               <a:rPr lang="en-US" smtClean="0"/>
-              <a:t>11/8/2016</a:t>
+              <a:t>1/27/2017</a:t>
             </a:fld>
             <a:endParaRPr lang="en-US"/>
           </a:p>
@@ -1414,10 +1405,9 @@
           </a:lstStyle>
           <a:p>
             <a:r>
-              <a:rPr lang="en-US" smtClean="0"/>
+              <a:rPr lang="en-US"/>
               <a:t>Click to edit Master title style</a:t>
             </a:r>
-            <a:endParaRPr lang="en-US"/>
           </a:p>
         </p:txBody>
       </p:sp>
@@ -1534,7 +1524,7 @@
           <a:p>
             <a:pPr lvl="0"/>
             <a:r>
-              <a:rPr lang="en-US" smtClean="0"/>
+              <a:rPr lang="en-US"/>
               <a:t>Click to edit Master text styles</a:t>
             </a:r>
           </a:p>
@@ -1557,7 +1547,7 @@
           <a:p>
             <a:fld id="{AB76F2E5-E013-4628-B8AF-912C7587513D}" type="datetimeFigureOut">
               <a:rPr lang="en-US" smtClean="0"/>
-              <a:t>11/8/2016</a:t>
+              <a:t>1/27/2017</a:t>
             </a:fld>
             <a:endParaRPr lang="en-US"/>
           </a:p>
@@ -1651,10 +1641,9 @@
           <a:lstStyle/>
           <a:p>
             <a:r>
-              <a:rPr lang="en-US" smtClean="0"/>
+              <a:rPr lang="en-US"/>
               <a:t>Click to edit Master title style</a:t>
             </a:r>
-            <a:endParaRPr lang="en-US"/>
           </a:p>
         </p:txBody>
       </p:sp>
@@ -1680,38 +1669,37 @@
           <a:p>
             <a:pPr lvl="0"/>
             <a:r>
-              <a:rPr lang="en-US" smtClean="0"/>
+              <a:rPr lang="en-US"/>
               <a:t>Click to edit Master text styles</a:t>
             </a:r>
           </a:p>
           <a:p>
             <a:pPr lvl="1"/>
             <a:r>
-              <a:rPr lang="en-US" smtClean="0"/>
+              <a:rPr lang="en-US"/>
               <a:t>Second level</a:t>
             </a:r>
           </a:p>
           <a:p>
             <a:pPr lvl="2"/>
             <a:r>
-              <a:rPr lang="en-US" smtClean="0"/>
+              <a:rPr lang="en-US"/>
               <a:t>Third level</a:t>
             </a:r>
           </a:p>
           <a:p>
             <a:pPr lvl="3"/>
             <a:r>
-              <a:rPr lang="en-US" smtClean="0"/>
+              <a:rPr lang="en-US"/>
               <a:t>Fourth level</a:t>
             </a:r>
           </a:p>
           <a:p>
             <a:pPr lvl="4"/>
             <a:r>
-              <a:rPr lang="en-US" smtClean="0"/>
+              <a:rPr lang="en-US"/>
               <a:t>Fifth level</a:t>
             </a:r>
-            <a:endParaRPr lang="en-US"/>
           </a:p>
         </p:txBody>
       </p:sp>
@@ -1737,38 +1725,37 @@
           <a:p>
             <a:pPr lvl="0"/>
             <a:r>
-              <a:rPr lang="en-US" smtClean="0"/>
+              <a:rPr lang="en-US"/>
               <a:t>Click to edit Master text styles</a:t>
             </a:r>
           </a:p>
           <a:p>
             <a:pPr lvl="1"/>
             <a:r>
-              <a:rPr lang="en-US" smtClean="0"/>
+              <a:rPr lang="en-US"/>
               <a:t>Second level</a:t>
             </a:r>
           </a:p>
           <a:p>
             <a:pPr lvl="2"/>
             <a:r>
-              <a:rPr lang="en-US" smtClean="0"/>
+              <a:rPr lang="en-US"/>
               <a:t>Third level</a:t>
             </a:r>
           </a:p>
           <a:p>
             <a:pPr lvl="3"/>
             <a:r>
-              <a:rPr lang="en-US" smtClean="0"/>
+              <a:rPr lang="en-US"/>
               <a:t>Fourth level</a:t>
             </a:r>
           </a:p>
           <a:p>
             <a:pPr lvl="4"/>
             <a:r>
-              <a:rPr lang="en-US" smtClean="0"/>
+              <a:rPr lang="en-US"/>
               <a:t>Fifth level</a:t>
             </a:r>
-            <a:endParaRPr lang="en-US"/>
           </a:p>
         </p:txBody>
       </p:sp>
@@ -1789,7 +1776,7 @@
           <a:p>
             <a:fld id="{AB76F2E5-E013-4628-B8AF-912C7587513D}" type="datetimeFigureOut">
               <a:rPr lang="en-US" smtClean="0"/>
-              <a:t>11/8/2016</a:t>
+              <a:t>1/27/2017</a:t>
             </a:fld>
             <a:endParaRPr lang="en-US"/>
           </a:p>
@@ -1888,10 +1875,9 @@
           <a:lstStyle/>
           <a:p>
             <a:r>
-              <a:rPr lang="en-US" smtClean="0"/>
+              <a:rPr lang="en-US"/>
               <a:t>Click to edit Master title style</a:t>
             </a:r>
-            <a:endParaRPr lang="en-US"/>
           </a:p>
         </p:txBody>
       </p:sp>
@@ -1954,7 +1940,7 @@
           <a:p>
             <a:pPr lvl="0"/>
             <a:r>
-              <a:rPr lang="en-US" smtClean="0"/>
+              <a:rPr lang="en-US"/>
               <a:t>Click to edit Master text styles</a:t>
             </a:r>
           </a:p>
@@ -1982,38 +1968,37 @@
           <a:p>
             <a:pPr lvl="0"/>
             <a:r>
-              <a:rPr lang="en-US" smtClean="0"/>
+              <a:rPr lang="en-US"/>
               <a:t>Click to edit Master text styles</a:t>
             </a:r>
           </a:p>
           <a:p>
             <a:pPr lvl="1"/>
             <a:r>
-              <a:rPr lang="en-US" smtClean="0"/>
+              <a:rPr lang="en-US"/>
               <a:t>Second level</a:t>
             </a:r>
           </a:p>
           <a:p>
             <a:pPr lvl="2"/>
             <a:r>
-              <a:rPr lang="en-US" smtClean="0"/>
+              <a:rPr lang="en-US"/>
               <a:t>Third level</a:t>
             </a:r>
           </a:p>
           <a:p>
             <a:pPr lvl="3"/>
             <a:r>
-              <a:rPr lang="en-US" smtClean="0"/>
+              <a:rPr lang="en-US"/>
               <a:t>Fourth level</a:t>
             </a:r>
           </a:p>
           <a:p>
             <a:pPr lvl="4"/>
             <a:r>
-              <a:rPr lang="en-US" smtClean="0"/>
+              <a:rPr lang="en-US"/>
               <a:t>Fifth level</a:t>
             </a:r>
-            <a:endParaRPr lang="en-US"/>
           </a:p>
         </p:txBody>
       </p:sp>
@@ -2076,7 +2061,7 @@
           <a:p>
             <a:pPr lvl="0"/>
             <a:r>
-              <a:rPr lang="en-US" smtClean="0"/>
+              <a:rPr lang="en-US"/>
               <a:t>Click to edit Master text styles</a:t>
             </a:r>
           </a:p>
@@ -2104,38 +2089,37 @@
           <a:p>
             <a:pPr lvl="0"/>
             <a:r>
-              <a:rPr lang="en-US" smtClean="0"/>
+              <a:rPr lang="en-US"/>
               <a:t>Click to edit Master text styles</a:t>
             </a:r>
           </a:p>
           <a:p>
             <a:pPr lvl="1"/>
             <a:r>
-              <a:rPr lang="en-US" smtClean="0"/>
+              <a:rPr lang="en-US"/>
               <a:t>Second level</a:t>
             </a:r>
           </a:p>
           <a:p>
             <a:pPr lvl="2"/>
             <a:r>
-              <a:rPr lang="en-US" smtClean="0"/>
+              <a:rPr lang="en-US"/>
               <a:t>Third level</a:t>
             </a:r>
           </a:p>
           <a:p>
             <a:pPr lvl="3"/>
             <a:r>
-              <a:rPr lang="en-US" smtClean="0"/>
+              <a:rPr lang="en-US"/>
               <a:t>Fourth level</a:t>
             </a:r>
           </a:p>
           <a:p>
             <a:pPr lvl="4"/>
             <a:r>
-              <a:rPr lang="en-US" smtClean="0"/>
+              <a:rPr lang="en-US"/>
               <a:t>Fifth level</a:t>
             </a:r>
-            <a:endParaRPr lang="en-US"/>
           </a:p>
         </p:txBody>
       </p:sp>
@@ -2156,7 +2140,7 @@
           <a:p>
             <a:fld id="{AB76F2E5-E013-4628-B8AF-912C7587513D}" type="datetimeFigureOut">
               <a:rPr lang="en-US" smtClean="0"/>
-              <a:t>11/8/2016</a:t>
+              <a:t>1/27/2017</a:t>
             </a:fld>
             <a:endParaRPr lang="en-US"/>
           </a:p>
@@ -2250,10 +2234,9 @@
           <a:lstStyle/>
           <a:p>
             <a:r>
-              <a:rPr lang="en-US" smtClean="0"/>
+              <a:rPr lang="en-US"/>
               <a:t>Click to edit Master title style</a:t>
             </a:r>
-            <a:endParaRPr lang="en-US"/>
           </a:p>
         </p:txBody>
       </p:sp>
@@ -2274,7 +2257,7 @@
           <a:p>
             <a:fld id="{AB76F2E5-E013-4628-B8AF-912C7587513D}" type="datetimeFigureOut">
               <a:rPr lang="en-US" smtClean="0"/>
-              <a:t>11/8/2016</a:t>
+              <a:t>1/27/2017</a:t>
             </a:fld>
             <a:endParaRPr lang="en-US"/>
           </a:p>
@@ -2369,7 +2352,7 @@
           <a:p>
             <a:fld id="{AB76F2E5-E013-4628-B8AF-912C7587513D}" type="datetimeFigureOut">
               <a:rPr lang="en-US" smtClean="0"/>
-              <a:t>11/8/2016</a:t>
+              <a:t>1/27/2017</a:t>
             </a:fld>
             <a:endParaRPr lang="en-US"/>
           </a:p>
@@ -2472,10 +2455,9 @@
           </a:lstStyle>
           <a:p>
             <a:r>
-              <a:rPr lang="en-US" smtClean="0"/>
+              <a:rPr lang="en-US"/>
               <a:t>Click to edit Master title style</a:t>
             </a:r>
-            <a:endParaRPr lang="en-US"/>
           </a:p>
         </p:txBody>
       </p:sp>
@@ -2529,38 +2511,37 @@
           <a:p>
             <a:pPr lvl="0"/>
             <a:r>
-              <a:rPr lang="en-US" smtClean="0"/>
+              <a:rPr lang="en-US"/>
               <a:t>Click to edit Master text styles</a:t>
             </a:r>
           </a:p>
           <a:p>
             <a:pPr lvl="1"/>
             <a:r>
-              <a:rPr lang="en-US" smtClean="0"/>
+              <a:rPr lang="en-US"/>
               <a:t>Second level</a:t>
             </a:r>
           </a:p>
           <a:p>
             <a:pPr lvl="2"/>
             <a:r>
-              <a:rPr lang="en-US" smtClean="0"/>
+              <a:rPr lang="en-US"/>
               <a:t>Third level</a:t>
             </a:r>
           </a:p>
           <a:p>
             <a:pPr lvl="3"/>
             <a:r>
-              <a:rPr lang="en-US" smtClean="0"/>
+              <a:rPr lang="en-US"/>
               <a:t>Fourth level</a:t>
             </a:r>
           </a:p>
           <a:p>
             <a:pPr lvl="4"/>
             <a:r>
-              <a:rPr lang="en-US" smtClean="0"/>
+              <a:rPr lang="en-US"/>
               <a:t>Fifth level</a:t>
             </a:r>
-            <a:endParaRPr lang="en-US"/>
           </a:p>
         </p:txBody>
       </p:sp>
@@ -2623,7 +2604,7 @@
           <a:p>
             <a:pPr lvl="0"/>
             <a:r>
-              <a:rPr lang="en-US" smtClean="0"/>
+              <a:rPr lang="en-US"/>
               <a:t>Click to edit Master text styles</a:t>
             </a:r>
           </a:p>
@@ -2646,7 +2627,7 @@
           <a:p>
             <a:fld id="{AB76F2E5-E013-4628-B8AF-912C7587513D}" type="datetimeFigureOut">
               <a:rPr lang="en-US" smtClean="0"/>
-              <a:t>11/8/2016</a:t>
+              <a:t>1/27/2017</a:t>
             </a:fld>
             <a:endParaRPr lang="en-US"/>
           </a:p>
@@ -2749,10 +2730,9 @@
           </a:lstStyle>
           <a:p>
             <a:r>
-              <a:rPr lang="en-US" smtClean="0"/>
+              <a:rPr lang="en-US"/>
               <a:t>Click to edit Master title style</a:t>
             </a:r>
-            <a:endParaRPr lang="en-US"/>
           </a:p>
         </p:txBody>
       </p:sp>
@@ -2876,7 +2856,7 @@
           <a:p>
             <a:pPr lvl="0"/>
             <a:r>
-              <a:rPr lang="en-US" smtClean="0"/>
+              <a:rPr lang="en-US"/>
               <a:t>Click to edit Master text styles</a:t>
             </a:r>
           </a:p>
@@ -2899,7 +2879,7 @@
           <a:p>
             <a:fld id="{AB76F2E5-E013-4628-B8AF-912C7587513D}" type="datetimeFigureOut">
               <a:rPr lang="en-US" smtClean="0"/>
-              <a:t>11/8/2016</a:t>
+              <a:t>1/27/2017</a:t>
             </a:fld>
             <a:endParaRPr lang="en-US"/>
           </a:p>
@@ -3008,10 +2988,9 @@
           <a:lstStyle/>
           <a:p>
             <a:r>
-              <a:rPr lang="en-US" smtClean="0"/>
+              <a:rPr lang="en-US"/>
               <a:t>Click to edit Master title style</a:t>
             </a:r>
-            <a:endParaRPr lang="en-US"/>
           </a:p>
         </p:txBody>
       </p:sp>
@@ -3042,38 +3021,37 @@
           <a:p>
             <a:pPr lvl="0"/>
             <a:r>
-              <a:rPr lang="en-US" smtClean="0"/>
+              <a:rPr lang="en-US"/>
               <a:t>Click to edit Master text styles</a:t>
             </a:r>
           </a:p>
           <a:p>
             <a:pPr lvl="1"/>
             <a:r>
-              <a:rPr lang="en-US" smtClean="0"/>
+              <a:rPr lang="en-US"/>
               <a:t>Second level</a:t>
             </a:r>
           </a:p>
           <a:p>
             <a:pPr lvl="2"/>
             <a:r>
-              <a:rPr lang="en-US" smtClean="0"/>
+              <a:rPr lang="en-US"/>
               <a:t>Third level</a:t>
             </a:r>
           </a:p>
           <a:p>
             <a:pPr lvl="3"/>
             <a:r>
-              <a:rPr lang="en-US" smtClean="0"/>
+              <a:rPr lang="en-US"/>
               <a:t>Fourth level</a:t>
             </a:r>
           </a:p>
           <a:p>
             <a:pPr lvl="4"/>
             <a:r>
-              <a:rPr lang="en-US" smtClean="0"/>
+              <a:rPr lang="en-US"/>
               <a:t>Fifth level</a:t>
             </a:r>
-            <a:endParaRPr lang="en-US"/>
           </a:p>
         </p:txBody>
       </p:sp>
@@ -3112,7 +3090,7 @@
           <a:p>
             <a:fld id="{AB76F2E5-E013-4628-B8AF-912C7587513D}" type="datetimeFigureOut">
               <a:rPr lang="en-US" smtClean="0"/>
-              <a:t>11/8/2016</a:t>
+              <a:t>1/27/2017</a:t>
             </a:fld>
             <a:endParaRPr lang="en-US"/>
           </a:p>
@@ -3540,7 +3518,7 @@
           <a:lstStyle/>
           <a:p>
             <a:r>
-              <a:rPr lang="en-US" dirty="0" smtClean="0"/>
+              <a:rPr lang="en-US" dirty="0"/>
               <a:t>To export the pictures:</a:t>
             </a:r>
           </a:p>
@@ -3550,7 +3528,7 @@
               <a:buChar char="-"/>
             </a:pPr>
             <a:r>
-              <a:rPr lang="en-US" dirty="0" smtClean="0"/>
+              <a:rPr lang="en-US" dirty="0"/>
               <a:t>Select the entire picture</a:t>
             </a:r>
           </a:p>
@@ -3560,7 +3538,7 @@
               <a:buChar char="-"/>
             </a:pPr>
             <a:r>
-              <a:rPr lang="en-US" dirty="0" smtClean="0"/>
+              <a:rPr lang="en-US" dirty="0"/>
               <a:t>Right click – save as picture</a:t>
             </a:r>
           </a:p>
@@ -3570,26 +3548,25 @@
               <a:buChar char="-"/>
             </a:pPr>
             <a:r>
-              <a:rPr lang="en-US" dirty="0" smtClean="0"/>
+              <a:rPr lang="en-US" dirty="0"/>
               <a:t>Select “</a:t>
             </a:r>
             <a:r>
-              <a:rPr lang="en-US" dirty="0" err="1" smtClean="0"/>
+              <a:rPr lang="en-US" dirty="0" err="1"/>
               <a:t>png</a:t>
             </a:r>
             <a:r>
-              <a:rPr lang="en-US" dirty="0" smtClean="0"/>
+              <a:rPr lang="en-US" dirty="0"/>
               <a:t>” format and save with the name written in the “notes</a:t>
             </a:r>
             <a:r>
-              <a:rPr lang="en-US" smtClean="0"/>
+              <a:rPr lang="en-US"/>
               <a:t>” section of </a:t>
             </a:r>
             <a:r>
-              <a:rPr lang="en-US" dirty="0" smtClean="0"/>
+              <a:rPr lang="en-US" dirty="0"/>
               <a:t>the slide.</a:t>
             </a:r>
-            <a:endParaRPr lang="en-US" dirty="0"/>
           </a:p>
         </p:txBody>
       </p:sp>
@@ -4468,10 +4445,10 @@
                 <a:ea typeface="+mn-ea"/>
                 <a:cs typeface="+mn-cs"/>
               </a:rPr>
-              <a:t>o</a:t>
-            </a:r>
-            <a:r>
-              <a:rPr kumimoji="0" lang="it-IT" sz="900" b="0" i="0" u="none" strike="noStrike" kern="0" cap="none" spc="0" normalizeH="0" baseline="0" noProof="0" dirty="0" err="1" smtClean="0">
+              <a:t>ovn</a:t>
+            </a:r>
+            <a:r>
+              <a:rPr kumimoji="0" lang="it-IT" sz="900" b="0" i="0" u="none" strike="noStrike" kern="0" cap="none" spc="0" normalizeH="0" baseline="0" noProof="0" dirty="0">
                 <a:ln>
                   <a:noFill/>
                 </a:ln>
@@ -4485,39 +4462,8 @@
                 <a:ea typeface="+mn-ea"/>
                 <a:cs typeface="+mn-cs"/>
               </a:rPr>
-              <a:t>vn</a:t>
-            </a:r>
-            <a:r>
-              <a:rPr kumimoji="0" lang="it-IT" sz="900" b="0" i="0" u="none" strike="noStrike" kern="0" cap="none" spc="0" normalizeH="0" baseline="0" noProof="0" dirty="0" smtClean="0">
-                <a:ln>
-                  <a:noFill/>
-                </a:ln>
-                <a:solidFill>
-                  <a:prstClr val="white"/>
-                </a:solidFill>
-                <a:effectLst/>
-                <a:uLnTx/>
-                <a:uFillTx/>
-                <a:latin typeface="Calibri"/>
-                <a:ea typeface="+mn-ea"/>
-                <a:cs typeface="+mn-cs"/>
-              </a:rPr>
               <a:t>-controller</a:t>
             </a:r>
-            <a:endParaRPr kumimoji="0" lang="it-IT" sz="900" b="0" i="0" u="none" strike="noStrike" kern="0" cap="none" spc="0" normalizeH="0" baseline="0" noProof="0" dirty="0">
-              <a:ln>
-                <a:noFill/>
-              </a:ln>
-              <a:solidFill>
-                <a:prstClr val="white"/>
-              </a:solidFill>
-              <a:effectLst/>
-              <a:uLnTx/>
-              <a:uFillTx/>
-              <a:latin typeface="Calibri"/>
-              <a:ea typeface="+mn-ea"/>
-              <a:cs typeface="+mn-cs"/>
-            </a:endParaRPr>
           </a:p>
         </p:txBody>
       </p:sp>
@@ -4720,7 +4666,7 @@
               <a:defRPr/>
             </a:pPr>
             <a:r>
-              <a:rPr kumimoji="0" lang="it-IT" sz="900" b="0" i="0" u="none" strike="noStrike" kern="0" cap="none" spc="0" normalizeH="0" baseline="0" noProof="0" dirty="0" smtClean="0">
+              <a:rPr kumimoji="0" lang="it-IT" sz="900" b="0" i="0" u="none" strike="noStrike" kern="0" cap="none" spc="0" normalizeH="0" baseline="0" noProof="0" dirty="0">
                 <a:ln>
                   <a:noFill/>
                 </a:ln>
@@ -4736,20 +4682,6 @@
               </a:rPr>
               <a:t>VM2</a:t>
             </a:r>
-            <a:endParaRPr kumimoji="0" lang="it-IT" sz="900" b="0" i="0" u="none" strike="noStrike" kern="0" cap="none" spc="0" normalizeH="0" baseline="0" noProof="0" dirty="0">
-              <a:ln>
-                <a:noFill/>
-              </a:ln>
-              <a:solidFill>
-                <a:prstClr val="black"/>
-              </a:solidFill>
-              <a:effectLst/>
-              <a:uLnTx/>
-              <a:uFillTx/>
-              <a:latin typeface="Calibri"/>
-              <a:ea typeface="+mn-ea"/>
-              <a:cs typeface="+mn-cs"/>
-            </a:endParaRPr>
           </a:p>
         </p:txBody>
       </p:sp>
@@ -4920,7 +4852,7 @@
               <a:defRPr/>
             </a:pPr>
             <a:r>
-              <a:rPr kumimoji="0" lang="it-IT" sz="900" b="0" i="0" u="none" strike="noStrike" kern="0" cap="none" spc="0" normalizeH="0" baseline="0" noProof="0" dirty="0" smtClean="0">
+              <a:rPr kumimoji="0" lang="it-IT" sz="900" b="0" i="0" u="none" strike="noStrike" kern="0" cap="none" spc="0" normalizeH="0" baseline="0" noProof="0" dirty="0">
                 <a:ln>
                   <a:noFill/>
                 </a:ln>
@@ -4936,20 +4868,6 @@
               </a:rPr>
               <a:t>VM1</a:t>
             </a:r>
-            <a:endParaRPr kumimoji="0" lang="it-IT" sz="900" b="0" i="0" u="none" strike="noStrike" kern="0" cap="none" spc="0" normalizeH="0" baseline="0" noProof="0" dirty="0">
-              <a:ln>
-                <a:noFill/>
-              </a:ln>
-              <a:solidFill>
-                <a:prstClr val="black"/>
-              </a:solidFill>
-              <a:effectLst/>
-              <a:uLnTx/>
-              <a:uFillTx/>
-              <a:latin typeface="Calibri"/>
-              <a:ea typeface="+mn-ea"/>
-              <a:cs typeface="+mn-cs"/>
-            </a:endParaRPr>
           </a:p>
         </p:txBody>
       </p:sp>
@@ -5340,7 +5258,7 @@
               <a:defRPr/>
             </a:pPr>
             <a:r>
-              <a:rPr kumimoji="0" lang="it-IT" sz="900" b="0" i="0" u="none" strike="noStrike" kern="0" cap="none" spc="0" normalizeH="0" baseline="0" noProof="0" dirty="0" err="1" smtClean="0">
+              <a:rPr kumimoji="0" lang="it-IT" sz="900" b="0" i="0" u="none" strike="noStrike" kern="0" cap="none" spc="0" normalizeH="0" baseline="0" noProof="0" dirty="0" err="1">
                 <a:ln>
                   <a:noFill/>
                 </a:ln>
@@ -5451,7 +5369,7 @@
               <a:defRPr/>
             </a:pPr>
             <a:r>
-              <a:rPr kumimoji="0" lang="it-IT" sz="900" b="0" i="0" u="none" strike="noStrike" kern="0" cap="none" spc="0" normalizeH="0" baseline="0" noProof="0" dirty="0" err="1" smtClean="0">
+              <a:rPr kumimoji="0" lang="it-IT" sz="900" b="0" i="0" u="none" strike="noStrike" kern="0" cap="none" spc="0" normalizeH="0" baseline="0" noProof="0" dirty="0" err="1">
                 <a:ln>
                   <a:noFill/>
                 </a:ln>
@@ -5573,23 +5491,6 @@
                 <a:cs typeface="+mn-cs"/>
               </a:rPr>
               <a:t>IOModule</a:t>
-            </a:r>
-            <a:r>
-              <a:rPr kumimoji="0" lang="it-IT" sz="900" b="0" i="0" u="none" strike="noStrike" kern="0" cap="none" spc="0" normalizeH="0" baseline="0" noProof="0" dirty="0">
-                <a:ln>
-                  <a:noFill/>
-                </a:ln>
-                <a:solidFill>
-                  <a:prstClr val="white"/>
-                </a:solidFill>
-                <a:effectLst/>
-                <a:uLnTx/>
-                <a:uFillTx/>
-                <a:latin typeface="Calibri"/>
-                <a:ea typeface="+mn-ea"/>
-                <a:cs typeface="+mn-cs"/>
-              </a:rPr>
-              <a:t/>
             </a:r>
             <a:br>
               <a:rPr kumimoji="0" lang="it-IT" sz="900" b="0" i="0" u="none" strike="noStrike" kern="0" cap="none" spc="0" normalizeH="0" baseline="0" noProof="0" dirty="0">
@@ -5843,23 +5744,6 @@
               </a:rPr>
               <a:t>IOModule</a:t>
             </a:r>
-            <a:r>
-              <a:rPr kumimoji="0" lang="it-IT" sz="900" b="0" i="0" u="none" strike="noStrike" kern="0" cap="none" spc="0" normalizeH="0" baseline="0" noProof="0" dirty="0">
-                <a:ln>
-                  <a:noFill/>
-                </a:ln>
-                <a:solidFill>
-                  <a:prstClr val="white"/>
-                </a:solidFill>
-                <a:effectLst/>
-                <a:uLnTx/>
-                <a:uFillTx/>
-                <a:latin typeface="Calibri"/>
-                <a:ea typeface="+mn-ea"/>
-                <a:cs typeface="+mn-cs"/>
-              </a:rPr>
-              <a:t/>
-            </a:r>
             <a:br>
               <a:rPr kumimoji="0" lang="it-IT" sz="900" b="0" i="0" u="none" strike="noStrike" kern="0" cap="none" spc="0" normalizeH="0" baseline="0" noProof="0" dirty="0">
                 <a:ln>
@@ -6054,24 +5938,7 @@
                 <a:ea typeface="+mn-ea"/>
                 <a:cs typeface="+mn-cs"/>
               </a:rPr>
-              <a:t>d</a:t>
-            </a:r>
-            <a:r>
-              <a:rPr kumimoji="0" lang="it-IT" sz="1200" b="0" i="0" u="none" strike="noStrike" kern="0" cap="none" spc="0" normalizeH="0" baseline="0" noProof="0" dirty="0" err="1" smtClean="0">
-                <a:ln>
-                  <a:noFill/>
-                </a:ln>
-                <a:solidFill>
-                  <a:prstClr val="black"/>
-                </a:solidFill>
-                <a:effectLst/>
-                <a:uLnTx/>
-                <a:uFillTx/>
-                <a:latin typeface="Calibri"/>
-                <a:ea typeface="+mn-ea"/>
-                <a:cs typeface="+mn-cs"/>
-              </a:rPr>
-              <a:t>aemon</a:t>
+              <a:t>daemon</a:t>
             </a:r>
             <a:endParaRPr kumimoji="0" lang="it-IT" sz="1200" b="0" i="0" u="none" strike="noStrike" kern="0" cap="none" spc="0" normalizeH="0" baseline="0" noProof="0" dirty="0">
               <a:ln>
@@ -6268,24 +6135,10 @@
                 <a:uLnTx/>
                 <a:uFillTx/>
               </a:rPr>
-              <a:t>H</a:t>
-            </a:r>
-            <a:r>
-              <a:rPr kumimoji="0" lang="it-IT" sz="1000" b="0" i="1" u="none" strike="noStrike" kern="0" cap="none" spc="0" normalizeH="0" baseline="0" noProof="0" dirty="0" err="1" smtClean="0">
-                <a:ln>
-                  <a:noFill/>
-                </a:ln>
-                <a:solidFill>
-                  <a:prstClr val="black"/>
-                </a:solidFill>
-                <a:effectLst/>
-                <a:uLnTx/>
-                <a:uFillTx/>
-              </a:rPr>
-              <a:t>over</a:t>
-            </a:r>
-            <a:r>
-              <a:rPr kumimoji="0" lang="it-IT" sz="1000" b="0" i="1" u="none" strike="noStrike" kern="0" cap="none" spc="0" normalizeH="0" baseline="0" noProof="0" dirty="0" smtClean="0">
+              <a:t>Hover</a:t>
+            </a:r>
+            <a:r>
+              <a:rPr kumimoji="0" lang="it-IT" sz="1000" b="0" i="1" u="none" strike="noStrike" kern="0" cap="none" spc="0" normalizeH="0" baseline="0" noProof="0" dirty="0">
                 <a:ln>
                   <a:noFill/>
                 </a:ln>
@@ -6528,39 +6381,8 @@
                 <a:ea typeface="+mn-ea"/>
                 <a:cs typeface="+mn-cs"/>
               </a:rPr>
-              <a:t>Compute </a:t>
-            </a:r>
-            <a:r>
-              <a:rPr kumimoji="0" lang="it-IT" sz="900" b="0" i="0" u="none" strike="noStrike" kern="0" cap="none" spc="0" normalizeH="0" baseline="0" noProof="0" dirty="0" smtClean="0">
-                <a:ln>
-                  <a:noFill/>
-                </a:ln>
-                <a:solidFill>
-                  <a:prstClr val="black"/>
-                </a:solidFill>
-                <a:effectLst/>
-                <a:uLnTx/>
-                <a:uFillTx/>
-                <a:latin typeface="Calibri"/>
-                <a:ea typeface="+mn-ea"/>
-                <a:cs typeface="+mn-cs"/>
-              </a:rPr>
-              <a:t>2</a:t>
-            </a:r>
-            <a:endParaRPr kumimoji="0" lang="it-IT" sz="900" b="0" i="0" u="none" strike="noStrike" kern="0" cap="none" spc="0" normalizeH="0" baseline="0" noProof="0" dirty="0">
-              <a:ln>
-                <a:noFill/>
-              </a:ln>
-              <a:solidFill>
-                <a:prstClr val="black"/>
-              </a:solidFill>
-              <a:effectLst/>
-              <a:uLnTx/>
-              <a:uFillTx/>
-              <a:latin typeface="Calibri"/>
-              <a:ea typeface="+mn-ea"/>
-              <a:cs typeface="+mn-cs"/>
-            </a:endParaRPr>
+              <a:t>Compute 2</a:t>
+            </a:r>
           </a:p>
         </p:txBody>
       </p:sp>
@@ -6627,10 +6449,10 @@
                 <a:ea typeface="+mn-ea"/>
                 <a:cs typeface="+mn-cs"/>
               </a:rPr>
-              <a:t>o</a:t>
-            </a:r>
-            <a:r>
-              <a:rPr kumimoji="0" lang="it-IT" sz="900" b="0" i="0" u="none" strike="noStrike" kern="0" cap="none" spc="0" normalizeH="0" baseline="0" noProof="0" dirty="0" err="1" smtClean="0">
+              <a:t>ovn</a:t>
+            </a:r>
+            <a:r>
+              <a:rPr kumimoji="0" lang="it-IT" sz="900" b="0" i="0" u="none" strike="noStrike" kern="0" cap="none" spc="0" normalizeH="0" baseline="0" noProof="0" dirty="0">
                 <a:ln>
                   <a:noFill/>
                 </a:ln>
@@ -6644,39 +6466,8 @@
                 <a:ea typeface="+mn-ea"/>
                 <a:cs typeface="+mn-cs"/>
               </a:rPr>
-              <a:t>vn</a:t>
-            </a:r>
-            <a:r>
-              <a:rPr kumimoji="0" lang="it-IT" sz="900" b="0" i="0" u="none" strike="noStrike" kern="0" cap="none" spc="0" normalizeH="0" baseline="0" noProof="0" dirty="0" smtClean="0">
-                <a:ln>
-                  <a:noFill/>
-                </a:ln>
-                <a:solidFill>
-                  <a:prstClr val="white"/>
-                </a:solidFill>
-                <a:effectLst/>
-                <a:uLnTx/>
-                <a:uFillTx/>
-                <a:latin typeface="Calibri"/>
-                <a:ea typeface="+mn-ea"/>
-                <a:cs typeface="+mn-cs"/>
-              </a:rPr>
               <a:t>-controller</a:t>
             </a:r>
-            <a:endParaRPr kumimoji="0" lang="it-IT" sz="900" b="0" i="0" u="none" strike="noStrike" kern="0" cap="none" spc="0" normalizeH="0" baseline="0" noProof="0" dirty="0">
-              <a:ln>
-                <a:noFill/>
-              </a:ln>
-              <a:solidFill>
-                <a:prstClr val="white"/>
-              </a:solidFill>
-              <a:effectLst/>
-              <a:uLnTx/>
-              <a:uFillTx/>
-              <a:latin typeface="Calibri"/>
-              <a:ea typeface="+mn-ea"/>
-              <a:cs typeface="+mn-cs"/>
-            </a:endParaRPr>
           </a:p>
         </p:txBody>
       </p:sp>
@@ -6879,7 +6670,7 @@
               <a:defRPr/>
             </a:pPr>
             <a:r>
-              <a:rPr kumimoji="0" lang="it-IT" sz="900" b="0" i="0" u="none" strike="noStrike" kern="0" cap="none" spc="0" normalizeH="0" baseline="0" noProof="0" dirty="0" smtClean="0">
+              <a:rPr kumimoji="0" lang="it-IT" sz="900" b="0" i="0" u="none" strike="noStrike" kern="0" cap="none" spc="0" normalizeH="0" baseline="0" noProof="0" dirty="0">
                 <a:ln>
                   <a:noFill/>
                 </a:ln>
@@ -6895,20 +6686,6 @@
               </a:rPr>
               <a:t>VM2</a:t>
             </a:r>
-            <a:endParaRPr kumimoji="0" lang="it-IT" sz="900" b="0" i="0" u="none" strike="noStrike" kern="0" cap="none" spc="0" normalizeH="0" baseline="0" noProof="0" dirty="0">
-              <a:ln>
-                <a:noFill/>
-              </a:ln>
-              <a:solidFill>
-                <a:prstClr val="black"/>
-              </a:solidFill>
-              <a:effectLst/>
-              <a:uLnTx/>
-              <a:uFillTx/>
-              <a:latin typeface="Calibri"/>
-              <a:ea typeface="+mn-ea"/>
-              <a:cs typeface="+mn-cs"/>
-            </a:endParaRPr>
           </a:p>
         </p:txBody>
       </p:sp>
@@ -7079,7 +6856,7 @@
               <a:defRPr/>
             </a:pPr>
             <a:r>
-              <a:rPr kumimoji="0" lang="it-IT" sz="900" b="0" i="0" u="none" strike="noStrike" kern="0" cap="none" spc="0" normalizeH="0" baseline="0" noProof="0" dirty="0" smtClean="0">
+              <a:rPr kumimoji="0" lang="it-IT" sz="900" b="0" i="0" u="none" strike="noStrike" kern="0" cap="none" spc="0" normalizeH="0" baseline="0" noProof="0" dirty="0">
                 <a:ln>
                   <a:noFill/>
                 </a:ln>
@@ -7095,20 +6872,6 @@
               </a:rPr>
               <a:t>VM1</a:t>
             </a:r>
-            <a:endParaRPr kumimoji="0" lang="it-IT" sz="900" b="0" i="0" u="none" strike="noStrike" kern="0" cap="none" spc="0" normalizeH="0" baseline="0" noProof="0" dirty="0">
-              <a:ln>
-                <a:noFill/>
-              </a:ln>
-              <a:solidFill>
-                <a:prstClr val="black"/>
-              </a:solidFill>
-              <a:effectLst/>
-              <a:uLnTx/>
-              <a:uFillTx/>
-              <a:latin typeface="Calibri"/>
-              <a:ea typeface="+mn-ea"/>
-              <a:cs typeface="+mn-cs"/>
-            </a:endParaRPr>
           </a:p>
         </p:txBody>
       </p:sp>
@@ -7375,7 +7138,7 @@
               <a:defRPr/>
             </a:pPr>
             <a:r>
-              <a:rPr kumimoji="0" lang="it-IT" sz="900" b="0" i="0" u="none" strike="noStrike" kern="0" cap="none" spc="0" normalizeH="0" baseline="0" noProof="0" dirty="0" err="1" smtClean="0">
+              <a:rPr kumimoji="0" lang="it-IT" sz="900" b="0" i="0" u="none" strike="noStrike" kern="0" cap="none" spc="0" normalizeH="0" baseline="0" noProof="0" dirty="0" err="1">
                 <a:ln>
                   <a:noFill/>
                 </a:ln>
@@ -7486,7 +7249,7 @@
               <a:defRPr/>
             </a:pPr>
             <a:r>
-              <a:rPr kumimoji="0" lang="it-IT" sz="900" b="0" i="0" u="none" strike="noStrike" kern="0" cap="none" spc="0" normalizeH="0" baseline="0" noProof="0" dirty="0" err="1" smtClean="0">
+              <a:rPr kumimoji="0" lang="it-IT" sz="900" b="0" i="0" u="none" strike="noStrike" kern="0" cap="none" spc="0" normalizeH="0" baseline="0" noProof="0" dirty="0" err="1">
                 <a:ln>
                   <a:noFill/>
                 </a:ln>
@@ -7608,23 +7371,6 @@
                 <a:cs typeface="+mn-cs"/>
               </a:rPr>
               <a:t>IOModule</a:t>
-            </a:r>
-            <a:r>
-              <a:rPr kumimoji="0" lang="it-IT" sz="900" b="0" i="0" u="none" strike="noStrike" kern="0" cap="none" spc="0" normalizeH="0" baseline="0" noProof="0" dirty="0">
-                <a:ln>
-                  <a:noFill/>
-                </a:ln>
-                <a:solidFill>
-                  <a:prstClr val="white"/>
-                </a:solidFill>
-                <a:effectLst/>
-                <a:uLnTx/>
-                <a:uFillTx/>
-                <a:latin typeface="Calibri"/>
-                <a:ea typeface="+mn-ea"/>
-                <a:cs typeface="+mn-cs"/>
-              </a:rPr>
-              <a:t/>
             </a:r>
             <a:br>
               <a:rPr kumimoji="0" lang="it-IT" sz="900" b="0" i="0" u="none" strike="noStrike" kern="0" cap="none" spc="0" normalizeH="0" baseline="0" noProof="0" dirty="0">
@@ -7878,23 +7624,6 @@
               </a:rPr>
               <a:t>IOModule</a:t>
             </a:r>
-            <a:r>
-              <a:rPr kumimoji="0" lang="it-IT" sz="900" b="0" i="0" u="none" strike="noStrike" kern="0" cap="none" spc="0" normalizeH="0" baseline="0" noProof="0" dirty="0">
-                <a:ln>
-                  <a:noFill/>
-                </a:ln>
-                <a:solidFill>
-                  <a:prstClr val="white"/>
-                </a:solidFill>
-                <a:effectLst/>
-                <a:uLnTx/>
-                <a:uFillTx/>
-                <a:latin typeface="Calibri"/>
-                <a:ea typeface="+mn-ea"/>
-                <a:cs typeface="+mn-cs"/>
-              </a:rPr>
-              <a:t/>
-            </a:r>
             <a:br>
               <a:rPr kumimoji="0" lang="it-IT" sz="900" b="0" i="0" u="none" strike="noStrike" kern="0" cap="none" spc="0" normalizeH="0" baseline="0" noProof="0" dirty="0">
                 <a:ln>
@@ -8304,7 +8033,7 @@
               <a:defRPr/>
             </a:pPr>
             <a:r>
-              <a:rPr kumimoji="0" lang="it-IT" sz="1000" b="0" i="0" u="none" strike="noStrike" kern="0" cap="none" spc="0" normalizeH="0" baseline="0" noProof="0" dirty="0" err="1" smtClean="0">
+              <a:rPr kumimoji="0" lang="it-IT" sz="1000" b="0" i="0" u="none" strike="noStrike" kern="0" cap="none" spc="0" normalizeH="0" baseline="0" noProof="0" dirty="0" err="1">
                 <a:ln>
                   <a:noFill/>
                 </a:ln>
@@ -8370,7 +8099,7 @@
               <a:defRPr/>
             </a:pPr>
             <a:r>
-              <a:rPr kumimoji="0" lang="it-IT" sz="1000" b="0" i="0" u="none" strike="noStrike" kern="0" cap="none" spc="0" normalizeH="0" baseline="0" noProof="0" dirty="0" err="1" smtClean="0">
+              <a:rPr kumimoji="0" lang="it-IT" sz="1000" b="0" i="0" u="none" strike="noStrike" kern="0" cap="none" spc="0" normalizeH="0" baseline="0" noProof="0" dirty="0" err="1">
                 <a:ln>
                   <a:noFill/>
                 </a:ln>
@@ -8839,7 +8568,7 @@
               <a:defRPr/>
             </a:pPr>
             <a:r>
-              <a:rPr kumimoji="0" lang="it-IT" sz="900" b="0" i="0" u="none" strike="noStrike" kern="0" cap="none" spc="0" normalizeH="0" baseline="0" noProof="0" dirty="0" smtClean="0">
+              <a:rPr kumimoji="0" lang="it-IT" sz="900" b="0" i="0" u="none" strike="noStrike" kern="0" cap="none" spc="0" normalizeH="0" baseline="0" noProof="0" dirty="0">
                 <a:ln>
                   <a:noFill/>
                 </a:ln>
@@ -8855,20 +8584,6 @@
               </a:rPr>
               <a:t>OVN</a:t>
             </a:r>
-            <a:endParaRPr kumimoji="0" lang="it-IT" sz="900" b="0" i="0" u="none" strike="noStrike" kern="0" cap="none" spc="0" normalizeH="0" baseline="0" noProof="0" dirty="0">
-              <a:ln>
-                <a:noFill/>
-              </a:ln>
-              <a:solidFill>
-                <a:prstClr val="white"/>
-              </a:solidFill>
-              <a:effectLst/>
-              <a:uLnTx/>
-              <a:uFillTx/>
-              <a:latin typeface="Calibri"/>
-              <a:ea typeface="+mn-ea"/>
-              <a:cs typeface="+mn-cs"/>
-            </a:endParaRPr>
           </a:p>
         </p:txBody>
       </p:sp>
@@ -9038,27 +8753,10 @@
                 <a:ea typeface="+mn-ea"/>
                 <a:cs typeface="+mn-cs"/>
               </a:rPr>
-              <a:t>O</a:t>
-            </a:r>
-            <a:r>
-              <a:rPr kumimoji="0" lang="it-IT" sz="900" b="0" i="0" u="none" strike="noStrike" kern="0" cap="none" spc="0" normalizeH="0" baseline="0" noProof="0" dirty="0" err="1" smtClean="0">
-                <a:ln>
-                  <a:noFill/>
-                </a:ln>
-                <a:solidFill>
-                  <a:prstClr val="white"/>
-                </a:solidFill>
-                <a:effectLst/>
-                <a:uLnTx/>
-                <a:uFillTx/>
-                <a:latin typeface="Calibri"/>
-                <a:ea typeface="+mn-ea"/>
-                <a:cs typeface="+mn-cs"/>
-              </a:rPr>
-              <a:t>vn</a:t>
-            </a:r>
-            <a:r>
-              <a:rPr kumimoji="0" lang="it-IT" sz="900" b="0" i="0" u="none" strike="noStrike" kern="0" cap="none" spc="0" normalizeH="0" baseline="0" noProof="0" dirty="0" smtClean="0">
+              <a:t>Ovn</a:t>
+            </a:r>
+            <a:r>
+              <a:rPr kumimoji="0" lang="it-IT" sz="900" b="0" i="0" u="none" strike="noStrike" kern="0" cap="none" spc="0" normalizeH="0" baseline="0" noProof="0" dirty="0">
                 <a:ln>
                   <a:noFill/>
                 </a:ln>
@@ -9108,10 +8806,10 @@
                 <a:ea typeface="+mn-ea"/>
                 <a:cs typeface="+mn-cs"/>
               </a:rPr>
-              <a:t>c</a:t>
-            </a:r>
-            <a:r>
-              <a:rPr kumimoji="0" lang="it-IT" sz="900" b="0" i="0" u="none" strike="noStrike" kern="0" cap="none" spc="0" normalizeH="0" baseline="0" noProof="0" dirty="0" smtClean="0">
+              <a:t>controller + </a:t>
+            </a:r>
+            <a:r>
+              <a:rPr kumimoji="0" lang="it-IT" sz="900" b="0" i="0" u="none" strike="noStrike" kern="0" cap="none" spc="0" normalizeH="0" baseline="0" noProof="0" dirty="0" err="1">
                 <a:ln>
                   <a:noFill/>
                 </a:ln>
@@ -9125,10 +8823,10 @@
                 <a:ea typeface="+mn-ea"/>
                 <a:cs typeface="+mn-cs"/>
               </a:rPr>
-              <a:t>ontroller + </a:t>
-            </a:r>
-            <a:r>
-              <a:rPr kumimoji="0" lang="it-IT" sz="900" b="0" i="0" u="none" strike="noStrike" kern="0" cap="none" spc="0" normalizeH="0" baseline="0" noProof="0" dirty="0" err="1">
+              <a:t>ovsdb</a:t>
+            </a:r>
+            <a:r>
+              <a:rPr kumimoji="0" lang="it-IT" sz="900" b="0" i="0" u="none" strike="noStrike" kern="0" cap="none" spc="0" normalizeH="0" baseline="0" noProof="0" dirty="0">
                 <a:ln>
                   <a:noFill/>
                 </a:ln>
@@ -9142,56 +8840,8 @@
                 <a:ea typeface="+mn-ea"/>
                 <a:cs typeface="+mn-cs"/>
               </a:rPr>
-              <a:t>o</a:t>
-            </a:r>
-            <a:r>
-              <a:rPr kumimoji="0" lang="it-IT" sz="900" b="0" i="0" u="none" strike="noStrike" kern="0" cap="none" spc="0" normalizeH="0" baseline="0" noProof="0" dirty="0" err="1" smtClean="0">
-                <a:ln>
-                  <a:noFill/>
-                </a:ln>
-                <a:solidFill>
-                  <a:prstClr val="white"/>
-                </a:solidFill>
-                <a:effectLst/>
-                <a:uLnTx/>
-                <a:uFillTx/>
-                <a:latin typeface="Calibri"/>
-                <a:ea typeface="+mn-ea"/>
-                <a:cs typeface="+mn-cs"/>
-              </a:rPr>
-              <a:t>vsdb</a:t>
-            </a:r>
-            <a:r>
-              <a:rPr kumimoji="0" lang="it-IT" sz="900" b="0" i="0" u="none" strike="noStrike" kern="0" cap="none" spc="0" normalizeH="0" baseline="0" noProof="0" dirty="0" smtClean="0">
-                <a:ln>
-                  <a:noFill/>
-                </a:ln>
-                <a:solidFill>
-                  <a:prstClr val="white"/>
-                </a:solidFill>
-                <a:effectLst/>
-                <a:uLnTx/>
-                <a:uFillTx/>
-                <a:latin typeface="Calibri"/>
-                <a:ea typeface="+mn-ea"/>
-                <a:cs typeface="+mn-cs"/>
-              </a:rPr>
               <a:t> server</a:t>
             </a:r>
-            <a:endParaRPr kumimoji="0" lang="it-IT" sz="900" b="0" i="0" u="none" strike="noStrike" kern="0" cap="none" spc="0" normalizeH="0" baseline="0" noProof="0" dirty="0">
-              <a:ln>
-                <a:noFill/>
-              </a:ln>
-              <a:solidFill>
-                <a:prstClr val="white"/>
-              </a:solidFill>
-              <a:effectLst/>
-              <a:uLnTx/>
-              <a:uFillTx/>
-              <a:latin typeface="Calibri"/>
-              <a:ea typeface="+mn-ea"/>
-              <a:cs typeface="+mn-cs"/>
-            </a:endParaRPr>
           </a:p>
         </p:txBody>
       </p:sp>
@@ -9362,7 +9012,7 @@
               <a:defRPr/>
             </a:pPr>
             <a:r>
-              <a:rPr kumimoji="0" lang="it-IT" sz="900" b="0" i="0" u="none" strike="noStrike" kern="0" cap="none" spc="0" normalizeH="0" baseline="0" noProof="0" dirty="0" smtClean="0">
+              <a:rPr kumimoji="0" lang="it-IT" sz="900" b="0" i="0" u="none" strike="noStrike" kern="0" cap="none" spc="0" normalizeH="0" baseline="0" noProof="0" dirty="0">
                 <a:ln>
                   <a:noFill/>
                 </a:ln>
@@ -9378,20 +9028,6 @@
               </a:rPr>
               <a:t>VM2</a:t>
             </a:r>
-            <a:endParaRPr kumimoji="0" lang="it-IT" sz="900" b="0" i="0" u="none" strike="noStrike" kern="0" cap="none" spc="0" normalizeH="0" baseline="0" noProof="0" dirty="0">
-              <a:ln>
-                <a:noFill/>
-              </a:ln>
-              <a:solidFill>
-                <a:prstClr val="black"/>
-              </a:solidFill>
-              <a:effectLst/>
-              <a:uLnTx/>
-              <a:uFillTx/>
-              <a:latin typeface="Calibri"/>
-              <a:ea typeface="+mn-ea"/>
-              <a:cs typeface="+mn-cs"/>
-            </a:endParaRPr>
           </a:p>
         </p:txBody>
       </p:sp>
@@ -9562,7 +9198,7 @@
               <a:defRPr/>
             </a:pPr>
             <a:r>
-              <a:rPr kumimoji="0" lang="it-IT" sz="900" b="0" i="0" u="none" strike="noStrike" kern="0" cap="none" spc="0" normalizeH="0" baseline="0" noProof="0" dirty="0" smtClean="0">
+              <a:rPr kumimoji="0" lang="it-IT" sz="900" b="0" i="0" u="none" strike="noStrike" kern="0" cap="none" spc="0" normalizeH="0" baseline="0" noProof="0" dirty="0">
                 <a:ln>
                   <a:noFill/>
                 </a:ln>
@@ -9578,20 +9214,6 @@
               </a:rPr>
               <a:t>VM1</a:t>
             </a:r>
-            <a:endParaRPr kumimoji="0" lang="it-IT" sz="900" b="0" i="0" u="none" strike="noStrike" kern="0" cap="none" spc="0" normalizeH="0" baseline="0" noProof="0" dirty="0">
-              <a:ln>
-                <a:noFill/>
-              </a:ln>
-              <a:solidFill>
-                <a:prstClr val="black"/>
-              </a:solidFill>
-              <a:effectLst/>
-              <a:uLnTx/>
-              <a:uFillTx/>
-              <a:latin typeface="Calibri"/>
-              <a:ea typeface="+mn-ea"/>
-              <a:cs typeface="+mn-cs"/>
-            </a:endParaRPr>
           </a:p>
         </p:txBody>
       </p:sp>
@@ -9861,7 +9483,7 @@
               <a:defRPr/>
             </a:pPr>
             <a:r>
-              <a:rPr kumimoji="0" lang="it-IT" sz="900" b="0" i="0" u="none" strike="noStrike" kern="0" cap="none" spc="0" normalizeH="0" baseline="0" noProof="0" dirty="0" err="1" smtClean="0">
+              <a:rPr kumimoji="0" lang="it-IT" sz="900" b="0" i="0" u="none" strike="noStrike" kern="0" cap="none" spc="0" normalizeH="0" baseline="0" noProof="0" dirty="0" err="1">
                 <a:ln>
                   <a:noFill/>
                 </a:ln>
@@ -9983,23 +9605,6 @@
                 <a:cs typeface="+mn-cs"/>
               </a:rPr>
               <a:t>IOModule</a:t>
-            </a:r>
-            <a:r>
-              <a:rPr kumimoji="0" lang="it-IT" sz="900" b="0" i="0" u="none" strike="noStrike" kern="0" cap="none" spc="0" normalizeH="0" baseline="0" noProof="0" dirty="0">
-                <a:ln>
-                  <a:noFill/>
-                </a:ln>
-                <a:solidFill>
-                  <a:prstClr val="white"/>
-                </a:solidFill>
-                <a:effectLst/>
-                <a:uLnTx/>
-                <a:uFillTx/>
-                <a:latin typeface="Calibri"/>
-                <a:ea typeface="+mn-ea"/>
-                <a:cs typeface="+mn-cs"/>
-              </a:rPr>
-              <a:t/>
             </a:r>
             <a:br>
               <a:rPr kumimoji="0" lang="it-IT" sz="900" b="0" i="0" u="none" strike="noStrike" kern="0" cap="none" spc="0" normalizeH="0" baseline="0" noProof="0" dirty="0">
@@ -10253,23 +9858,6 @@
               </a:rPr>
               <a:t>IOModule</a:t>
             </a:r>
-            <a:r>
-              <a:rPr kumimoji="0" lang="it-IT" sz="900" b="0" i="0" u="none" strike="noStrike" kern="0" cap="none" spc="0" normalizeH="0" baseline="0" noProof="0" dirty="0">
-                <a:ln>
-                  <a:noFill/>
-                </a:ln>
-                <a:solidFill>
-                  <a:prstClr val="white"/>
-                </a:solidFill>
-                <a:effectLst/>
-                <a:uLnTx/>
-                <a:uFillTx/>
-                <a:latin typeface="Calibri"/>
-                <a:ea typeface="+mn-ea"/>
-                <a:cs typeface="+mn-cs"/>
-              </a:rPr>
-              <a:t/>
-            </a:r>
             <a:br>
               <a:rPr kumimoji="0" lang="it-IT" sz="900" b="0" i="0" u="none" strike="noStrike" kern="0" cap="none" spc="0" normalizeH="0" baseline="0" noProof="0" dirty="0">
                 <a:ln>
@@ -10484,24 +10072,10 @@
                 <a:uLnTx/>
                 <a:uFillTx/>
               </a:rPr>
-              <a:t>H</a:t>
-            </a:r>
-            <a:r>
-              <a:rPr kumimoji="0" lang="it-IT" sz="1000" b="0" i="1" u="none" strike="noStrike" kern="0" cap="none" spc="0" normalizeH="0" baseline="0" noProof="0" dirty="0" err="1" smtClean="0">
-                <a:ln>
-                  <a:noFill/>
-                </a:ln>
-                <a:solidFill>
-                  <a:prstClr val="black"/>
-                </a:solidFill>
-                <a:effectLst/>
-                <a:uLnTx/>
-                <a:uFillTx/>
-              </a:rPr>
-              <a:t>over</a:t>
-            </a:r>
-            <a:r>
-              <a:rPr kumimoji="0" lang="it-IT" sz="1000" b="0" i="1" u="none" strike="noStrike" kern="0" cap="none" spc="0" normalizeH="0" baseline="0" noProof="0" dirty="0" smtClean="0">
+              <a:t>Hover</a:t>
+            </a:r>
+            <a:r>
+              <a:rPr kumimoji="0" lang="it-IT" sz="1000" b="0" i="1" u="none" strike="noStrike" kern="0" cap="none" spc="0" normalizeH="0" baseline="0" noProof="0" dirty="0">
                 <a:ln>
                   <a:noFill/>
                 </a:ln>
@@ -10816,7 +10390,7 @@
               </a:rPr>
               <a:t>OVN Monitor </a:t>
             </a:r>
-            <a:r>
+            <a:br>
               <a:rPr kumimoji="0" lang="it-IT" sz="800" b="0" i="0" u="none" strike="noStrike" kern="0" cap="none" spc="0" normalizeH="0" baseline="0" noProof="0" dirty="0">
                 <a:ln>
                   <a:noFill/>
@@ -10831,9 +10405,8 @@
                 <a:ea typeface="+mn-ea"/>
                 <a:cs typeface="+mn-cs"/>
               </a:rPr>
-              <a:t/>
-            </a:r>
-            <a:br>
+            </a:br>
+            <a:r>
               <a:rPr kumimoji="0" lang="it-IT" sz="800" b="0" i="0" u="none" strike="noStrike" kern="0" cap="none" spc="0" normalizeH="0" baseline="0" noProof="0" dirty="0">
                 <a:ln>
                   <a:noFill/>
@@ -10848,9 +10421,10 @@
                 <a:ea typeface="+mn-ea"/>
                 <a:cs typeface="+mn-cs"/>
               </a:rPr>
-            </a:br>
-            <a:r>
-              <a:rPr kumimoji="0" lang="it-IT" sz="800" b="0" i="0" u="none" strike="noStrike" kern="0" cap="none" spc="0" normalizeH="0" baseline="0" noProof="0" dirty="0">
+              <a:t>(</a:t>
+            </a:r>
+            <a:r>
+              <a:rPr kumimoji="0" lang="it-IT" sz="800" b="0" i="1" u="none" strike="noStrike" kern="0" cap="none" spc="0" normalizeH="0" baseline="0" noProof="0" dirty="0" err="1">
                 <a:ln>
                   <a:noFill/>
                 </a:ln>
@@ -10864,10 +10438,10 @@
                 <a:ea typeface="+mn-ea"/>
                 <a:cs typeface="+mn-cs"/>
               </a:rPr>
-              <a:t>(</a:t>
-            </a:r>
-            <a:r>
-              <a:rPr kumimoji="0" lang="it-IT" sz="800" b="0" i="1" u="none" strike="noStrike" kern="0" cap="none" spc="0" normalizeH="0" baseline="0" noProof="0" dirty="0" err="1">
+              <a:t>ovsdb</a:t>
+            </a:r>
+            <a:r>
+              <a:rPr kumimoji="0" lang="it-IT" sz="800" b="0" i="1" u="none" strike="noStrike" kern="0" cap="none" spc="0" normalizeH="0" baseline="0" noProof="0" dirty="0">
                 <a:ln>
                   <a:noFill/>
                 </a:ln>
@@ -10881,10 +10455,10 @@
                 <a:ea typeface="+mn-ea"/>
                 <a:cs typeface="+mn-cs"/>
               </a:rPr>
-              <a:t>ovsdb</a:t>
-            </a:r>
-            <a:r>
-              <a:rPr kumimoji="0" lang="it-IT" sz="800" b="0" i="1" u="none" strike="noStrike" kern="0" cap="none" spc="0" normalizeH="0" baseline="0" noProof="0" dirty="0">
+              <a:t> monitor for OVN NB, SB and </a:t>
+            </a:r>
+            <a:r>
+              <a:rPr kumimoji="0" lang="it-IT" sz="800" b="0" i="1" u="none" strike="noStrike" kern="0" cap="none" spc="0" normalizeH="0" baseline="0" noProof="0" dirty="0" err="1">
                 <a:ln>
                   <a:noFill/>
                 </a:ln>
@@ -10898,10 +10472,10 @@
                 <a:ea typeface="+mn-ea"/>
                 <a:cs typeface="+mn-cs"/>
               </a:rPr>
-              <a:t> monitor for </a:t>
-            </a:r>
-            <a:r>
-              <a:rPr kumimoji="0" lang="it-IT" sz="800" b="0" i="1" u="none" strike="noStrike" kern="0" cap="none" spc="0" normalizeH="0" baseline="0" noProof="0" dirty="0" smtClean="0">
+              <a:t>OvS</a:t>
+            </a:r>
+            <a:r>
+              <a:rPr kumimoji="0" lang="it-IT" sz="800" b="0" i="1" u="none" strike="noStrike" kern="0" cap="none" spc="0" normalizeH="0" baseline="0" noProof="0" dirty="0">
                 <a:ln>
                   <a:noFill/>
                 </a:ln>
@@ -10915,10 +10489,10 @@
                 <a:ea typeface="+mn-ea"/>
                 <a:cs typeface="+mn-cs"/>
               </a:rPr>
-              <a:t>OVN </a:t>
-            </a:r>
-            <a:r>
-              <a:rPr kumimoji="0" lang="it-IT" sz="800" b="0" i="1" u="none" strike="noStrike" kern="0" cap="none" spc="0" normalizeH="0" baseline="0" noProof="0" dirty="0">
+              <a:t> </a:t>
+            </a:r>
+            <a:r>
+              <a:rPr kumimoji="0" lang="it-IT" sz="800" b="0" i="1" u="none" strike="noStrike" kern="0" cap="none" spc="0" normalizeH="0" baseline="0" noProof="0" dirty="0" err="1">
                 <a:ln>
                   <a:noFill/>
                 </a:ln>
@@ -10932,10 +10506,10 @@
                 <a:ea typeface="+mn-ea"/>
                 <a:cs typeface="+mn-cs"/>
               </a:rPr>
-              <a:t>NB, SB and </a:t>
-            </a:r>
-            <a:r>
-              <a:rPr kumimoji="0" lang="it-IT" sz="800" b="0" i="1" u="none" strike="noStrike" kern="0" cap="none" spc="0" normalizeH="0" baseline="0" noProof="0" dirty="0" err="1" smtClean="0">
+              <a:t>databases</a:t>
+            </a:r>
+            <a:r>
+              <a:rPr kumimoji="0" lang="it-IT" sz="800" b="0" i="0" u="none" strike="noStrike" kern="0" cap="none" spc="0" normalizeH="0" baseline="0" noProof="0" dirty="0">
                 <a:ln>
                   <a:noFill/>
                 </a:ln>
@@ -10949,73 +10523,8 @@
                 <a:ea typeface="+mn-ea"/>
                 <a:cs typeface="+mn-cs"/>
               </a:rPr>
-              <a:t>OvS</a:t>
-            </a:r>
-            <a:r>
-              <a:rPr kumimoji="0" lang="it-IT" sz="800" b="0" i="1" u="none" strike="noStrike" kern="0" cap="none" spc="0" normalizeH="0" baseline="0" noProof="0" dirty="0" smtClean="0">
-                <a:ln>
-                  <a:noFill/>
-                </a:ln>
-                <a:solidFill>
-                  <a:prstClr val="black"/>
-                </a:solidFill>
-                <a:effectLst/>
-                <a:uLnTx/>
-                <a:uFillTx/>
-                <a:latin typeface="Calibri"/>
-                <a:ea typeface="+mn-ea"/>
-                <a:cs typeface="+mn-cs"/>
-              </a:rPr>
-              <a:t> </a:t>
-            </a:r>
-            <a:r>
-              <a:rPr kumimoji="0" lang="it-IT" sz="800" b="0" i="1" u="none" strike="noStrike" kern="0" cap="none" spc="0" normalizeH="0" baseline="0" noProof="0" dirty="0" err="1" smtClean="0">
-                <a:ln>
-                  <a:noFill/>
-                </a:ln>
-                <a:solidFill>
-                  <a:prstClr val="black"/>
-                </a:solidFill>
-                <a:effectLst/>
-                <a:uLnTx/>
-                <a:uFillTx/>
-                <a:latin typeface="Calibri"/>
-                <a:ea typeface="+mn-ea"/>
-                <a:cs typeface="+mn-cs"/>
-              </a:rPr>
-              <a:t>databases</a:t>
-            </a:r>
-            <a:r>
-              <a:rPr kumimoji="0" lang="it-IT" sz="800" b="0" i="0" u="none" strike="noStrike" kern="0" cap="none" spc="0" normalizeH="0" baseline="0" noProof="0" dirty="0" smtClean="0">
-                <a:ln>
-                  <a:noFill/>
-                </a:ln>
-                <a:solidFill>
-                  <a:prstClr val="black"/>
-                </a:solidFill>
-                <a:effectLst/>
-                <a:uLnTx/>
-                <a:uFillTx/>
-                <a:latin typeface="Calibri"/>
-                <a:ea typeface="+mn-ea"/>
-                <a:cs typeface="+mn-cs"/>
-              </a:rPr>
               <a:t>)</a:t>
             </a:r>
-            <a:endParaRPr kumimoji="0" lang="it-IT" sz="800" b="0" i="0" u="none" strike="noStrike" kern="0" cap="none" spc="0" normalizeH="0" baseline="0" noProof="0" dirty="0">
-              <a:ln>
-                <a:noFill/>
-              </a:ln>
-              <a:solidFill>
-                <a:prstClr val="black"/>
-              </a:solidFill>
-              <a:effectLst/>
-              <a:uLnTx/>
-              <a:uFillTx/>
-              <a:latin typeface="Calibri"/>
-              <a:ea typeface="+mn-ea"/>
-              <a:cs typeface="+mn-cs"/>
-            </a:endParaRPr>
           </a:p>
         </p:txBody>
       </p:sp>
@@ -11417,7 +10926,7 @@
               <a:t> </a:t>
             </a:r>
             <a:r>
-              <a:rPr kumimoji="0" lang="it-IT" sz="1200" b="0" i="0" u="none" strike="noStrike" kern="0" cap="none" spc="0" normalizeH="0" baseline="0" noProof="0" dirty="0" err="1" smtClean="0">
+              <a:rPr kumimoji="0" lang="it-IT" sz="1200" b="0" i="0" u="none" strike="noStrike" kern="0" cap="none" spc="0" normalizeH="0" baseline="0" noProof="0" dirty="0" err="1">
                 <a:ln>
                   <a:noFill/>
                 </a:ln>
@@ -12250,10 +11759,10 @@
                 <a:uLnTx/>
                 <a:uFillTx/>
               </a:rPr>
-              <a:t>o</a:t>
-            </a:r>
-            <a:r>
-              <a:rPr kumimoji="0" lang="it-IT" sz="1000" b="0" i="1" u="none" strike="noStrike" kern="0" cap="none" spc="0" normalizeH="0" baseline="0" noProof="0" dirty="0" err="1" smtClean="0">
+              <a:t>ovsdb</a:t>
+            </a:r>
+            <a:r>
+              <a:rPr kumimoji="0" lang="it-IT" sz="1000" b="0" i="1" u="none" strike="noStrike" kern="0" cap="none" spc="0" normalizeH="0" baseline="0" noProof="0" dirty="0">
                 <a:ln>
                   <a:noFill/>
                 </a:ln>
@@ -12264,24 +11773,10 @@
                 <a:uLnTx/>
                 <a:uFillTx/>
               </a:rPr>
-              <a:t>vsdb</a:t>
-            </a:r>
-            <a:r>
-              <a:rPr kumimoji="0" lang="it-IT" sz="1000" b="0" i="1" u="none" strike="noStrike" kern="0" cap="none" spc="0" normalizeH="0" baseline="0" noProof="0" dirty="0" smtClean="0">
-                <a:ln>
-                  <a:noFill/>
-                </a:ln>
-                <a:solidFill>
-                  <a:prstClr val="black"/>
-                </a:solidFill>
-                <a:effectLst/>
-                <a:uLnTx/>
-                <a:uFillTx/>
-              </a:rPr>
               <a:t> </a:t>
             </a:r>
             <a:r>
-              <a:rPr kumimoji="0" lang="it-IT" sz="1000" b="0" i="1" u="none" strike="noStrike" kern="0" cap="none" spc="0" normalizeH="0" baseline="0" noProof="0" dirty="0" err="1" smtClean="0">
+              <a:rPr kumimoji="0" lang="it-IT" sz="1000" b="0" i="1" u="none" strike="noStrike" kern="0" cap="none" spc="0" normalizeH="0" baseline="0" noProof="0" dirty="0" err="1">
                 <a:ln>
                   <a:noFill/>
                 </a:ln>
@@ -12374,39 +11869,8 @@
                 <a:ea typeface="+mn-ea"/>
                 <a:cs typeface="+mn-cs"/>
               </a:rPr>
-              <a:t>Compute </a:t>
-            </a:r>
-            <a:r>
-              <a:rPr kumimoji="0" lang="it-IT" sz="900" b="0" i="0" u="none" strike="noStrike" kern="0" cap="none" spc="0" normalizeH="0" baseline="0" noProof="0" dirty="0" smtClean="0">
-                <a:ln>
-                  <a:noFill/>
-                </a:ln>
-                <a:solidFill>
-                  <a:prstClr val="black"/>
-                </a:solidFill>
-                <a:effectLst/>
-                <a:uLnTx/>
-                <a:uFillTx/>
-                <a:latin typeface="Calibri"/>
-                <a:ea typeface="+mn-ea"/>
-                <a:cs typeface="+mn-cs"/>
-              </a:rPr>
-              <a:t>2</a:t>
-            </a:r>
-            <a:endParaRPr kumimoji="0" lang="it-IT" sz="900" b="0" i="0" u="none" strike="noStrike" kern="0" cap="none" spc="0" normalizeH="0" baseline="0" noProof="0" dirty="0">
-              <a:ln>
-                <a:noFill/>
-              </a:ln>
-              <a:solidFill>
-                <a:prstClr val="black"/>
-              </a:solidFill>
-              <a:effectLst/>
-              <a:uLnTx/>
-              <a:uFillTx/>
-              <a:latin typeface="Calibri"/>
-              <a:ea typeface="+mn-ea"/>
-              <a:cs typeface="+mn-cs"/>
-            </a:endParaRPr>
+              <a:t>Compute 2</a:t>
+            </a:r>
           </a:p>
         </p:txBody>
       </p:sp>
@@ -12473,27 +11937,10 @@
                 <a:ea typeface="+mn-ea"/>
                 <a:cs typeface="+mn-cs"/>
               </a:rPr>
-              <a:t>O</a:t>
-            </a:r>
-            <a:r>
-              <a:rPr kumimoji="0" lang="it-IT" sz="900" b="0" i="0" u="none" strike="noStrike" kern="0" cap="none" spc="0" normalizeH="0" baseline="0" noProof="0" dirty="0" err="1" smtClean="0">
-                <a:ln>
-                  <a:noFill/>
-                </a:ln>
-                <a:solidFill>
-                  <a:prstClr val="white"/>
-                </a:solidFill>
-                <a:effectLst/>
-                <a:uLnTx/>
-                <a:uFillTx/>
-                <a:latin typeface="Calibri"/>
-                <a:ea typeface="+mn-ea"/>
-                <a:cs typeface="+mn-cs"/>
-              </a:rPr>
-              <a:t>vn</a:t>
-            </a:r>
-            <a:r>
-              <a:rPr kumimoji="0" lang="it-IT" sz="900" b="0" i="0" u="none" strike="noStrike" kern="0" cap="none" spc="0" normalizeH="0" baseline="0" noProof="0" dirty="0" smtClean="0">
+              <a:t>Ovn</a:t>
+            </a:r>
+            <a:r>
+              <a:rPr kumimoji="0" lang="it-IT" sz="900" b="0" i="0" u="none" strike="noStrike" kern="0" cap="none" spc="0" normalizeH="0" baseline="0" noProof="0" dirty="0">
                 <a:ln>
                   <a:noFill/>
                 </a:ln>
@@ -12543,10 +11990,10 @@
                 <a:ea typeface="+mn-ea"/>
                 <a:cs typeface="+mn-cs"/>
               </a:rPr>
-              <a:t>c</a:t>
-            </a:r>
-            <a:r>
-              <a:rPr kumimoji="0" lang="it-IT" sz="900" b="0" i="0" u="none" strike="noStrike" kern="0" cap="none" spc="0" normalizeH="0" baseline="0" noProof="0" dirty="0" smtClean="0">
+              <a:t>controller + </a:t>
+            </a:r>
+            <a:r>
+              <a:rPr kumimoji="0" lang="it-IT" sz="900" b="0" i="0" u="none" strike="noStrike" kern="0" cap="none" spc="0" normalizeH="0" baseline="0" noProof="0" dirty="0" err="1">
                 <a:ln>
                   <a:noFill/>
                 </a:ln>
@@ -12560,10 +12007,10 @@
                 <a:ea typeface="+mn-ea"/>
                 <a:cs typeface="+mn-cs"/>
               </a:rPr>
-              <a:t>ontroller + </a:t>
-            </a:r>
-            <a:r>
-              <a:rPr kumimoji="0" lang="it-IT" sz="900" b="0" i="0" u="none" strike="noStrike" kern="0" cap="none" spc="0" normalizeH="0" baseline="0" noProof="0" dirty="0" err="1">
+              <a:t>ovsdb</a:t>
+            </a:r>
+            <a:r>
+              <a:rPr kumimoji="0" lang="it-IT" sz="900" b="0" i="0" u="none" strike="noStrike" kern="0" cap="none" spc="0" normalizeH="0" baseline="0" noProof="0" dirty="0">
                 <a:ln>
                   <a:noFill/>
                 </a:ln>
@@ -12577,56 +12024,8 @@
                 <a:ea typeface="+mn-ea"/>
                 <a:cs typeface="+mn-cs"/>
               </a:rPr>
-              <a:t>o</a:t>
-            </a:r>
-            <a:r>
-              <a:rPr kumimoji="0" lang="it-IT" sz="900" b="0" i="0" u="none" strike="noStrike" kern="0" cap="none" spc="0" normalizeH="0" baseline="0" noProof="0" dirty="0" err="1" smtClean="0">
-                <a:ln>
-                  <a:noFill/>
-                </a:ln>
-                <a:solidFill>
-                  <a:prstClr val="white"/>
-                </a:solidFill>
-                <a:effectLst/>
-                <a:uLnTx/>
-                <a:uFillTx/>
-                <a:latin typeface="Calibri"/>
-                <a:ea typeface="+mn-ea"/>
-                <a:cs typeface="+mn-cs"/>
-              </a:rPr>
-              <a:t>vsdb</a:t>
-            </a:r>
-            <a:r>
-              <a:rPr kumimoji="0" lang="it-IT" sz="900" b="0" i="0" u="none" strike="noStrike" kern="0" cap="none" spc="0" normalizeH="0" baseline="0" noProof="0" dirty="0" smtClean="0">
-                <a:ln>
-                  <a:noFill/>
-                </a:ln>
-                <a:solidFill>
-                  <a:prstClr val="white"/>
-                </a:solidFill>
-                <a:effectLst/>
-                <a:uLnTx/>
-                <a:uFillTx/>
-                <a:latin typeface="Calibri"/>
-                <a:ea typeface="+mn-ea"/>
-                <a:cs typeface="+mn-cs"/>
-              </a:rPr>
               <a:t> server</a:t>
             </a:r>
-            <a:endParaRPr kumimoji="0" lang="it-IT" sz="900" b="0" i="0" u="none" strike="noStrike" kern="0" cap="none" spc="0" normalizeH="0" baseline="0" noProof="0" dirty="0">
-              <a:ln>
-                <a:noFill/>
-              </a:ln>
-              <a:solidFill>
-                <a:prstClr val="white"/>
-              </a:solidFill>
-              <a:effectLst/>
-              <a:uLnTx/>
-              <a:uFillTx/>
-              <a:latin typeface="Calibri"/>
-              <a:ea typeface="+mn-ea"/>
-              <a:cs typeface="+mn-cs"/>
-            </a:endParaRPr>
           </a:p>
         </p:txBody>
       </p:sp>
@@ -12797,7 +12196,7 @@
               <a:defRPr/>
             </a:pPr>
             <a:r>
-              <a:rPr kumimoji="0" lang="it-IT" sz="900" b="0" i="0" u="none" strike="noStrike" kern="0" cap="none" spc="0" normalizeH="0" baseline="0" noProof="0" dirty="0" smtClean="0">
+              <a:rPr kumimoji="0" lang="it-IT" sz="900" b="0" i="0" u="none" strike="noStrike" kern="0" cap="none" spc="0" normalizeH="0" baseline="0" noProof="0" dirty="0">
                 <a:ln>
                   <a:noFill/>
                 </a:ln>
@@ -12813,20 +12212,6 @@
               </a:rPr>
               <a:t>VM2</a:t>
             </a:r>
-            <a:endParaRPr kumimoji="0" lang="it-IT" sz="900" b="0" i="0" u="none" strike="noStrike" kern="0" cap="none" spc="0" normalizeH="0" baseline="0" noProof="0" dirty="0">
-              <a:ln>
-                <a:noFill/>
-              </a:ln>
-              <a:solidFill>
-                <a:prstClr val="black"/>
-              </a:solidFill>
-              <a:effectLst/>
-              <a:uLnTx/>
-              <a:uFillTx/>
-              <a:latin typeface="Calibri"/>
-              <a:ea typeface="+mn-ea"/>
-              <a:cs typeface="+mn-cs"/>
-            </a:endParaRPr>
           </a:p>
         </p:txBody>
       </p:sp>
@@ -12997,7 +12382,7 @@
               <a:defRPr/>
             </a:pPr>
             <a:r>
-              <a:rPr kumimoji="0" lang="it-IT" sz="900" b="0" i="0" u="none" strike="noStrike" kern="0" cap="none" spc="0" normalizeH="0" baseline="0" noProof="0" dirty="0" smtClean="0">
+              <a:rPr kumimoji="0" lang="it-IT" sz="900" b="0" i="0" u="none" strike="noStrike" kern="0" cap="none" spc="0" normalizeH="0" baseline="0" noProof="0" dirty="0">
                 <a:ln>
                   <a:noFill/>
                 </a:ln>
@@ -13013,20 +12398,6 @@
               </a:rPr>
               <a:t>VM1</a:t>
             </a:r>
-            <a:endParaRPr kumimoji="0" lang="it-IT" sz="900" b="0" i="0" u="none" strike="noStrike" kern="0" cap="none" spc="0" normalizeH="0" baseline="0" noProof="0" dirty="0">
-              <a:ln>
-                <a:noFill/>
-              </a:ln>
-              <a:solidFill>
-                <a:prstClr val="black"/>
-              </a:solidFill>
-              <a:effectLst/>
-              <a:uLnTx/>
-              <a:uFillTx/>
-              <a:latin typeface="Calibri"/>
-              <a:ea typeface="+mn-ea"/>
-              <a:cs typeface="+mn-cs"/>
-            </a:endParaRPr>
           </a:p>
         </p:txBody>
       </p:sp>
@@ -13172,7 +12543,7 @@
               <a:defRPr/>
             </a:pPr>
             <a:r>
-              <a:rPr kumimoji="0" lang="it-IT" sz="900" b="0" i="0" u="none" strike="noStrike" kern="0" cap="none" spc="0" normalizeH="0" baseline="0" noProof="0" dirty="0" err="1" smtClean="0">
+              <a:rPr kumimoji="0" lang="it-IT" sz="900" b="0" i="0" u="none" strike="noStrike" kern="0" cap="none" spc="0" normalizeH="0" baseline="0" noProof="0" dirty="0" err="1">
                 <a:ln>
                   <a:noFill/>
                 </a:ln>
@@ -13294,23 +12665,6 @@
                 <a:cs typeface="+mn-cs"/>
               </a:rPr>
               <a:t>IOModule</a:t>
-            </a:r>
-            <a:r>
-              <a:rPr kumimoji="0" lang="it-IT" sz="900" b="0" i="0" u="none" strike="noStrike" kern="0" cap="none" spc="0" normalizeH="0" baseline="0" noProof="0" dirty="0">
-                <a:ln>
-                  <a:noFill/>
-                </a:ln>
-                <a:solidFill>
-                  <a:prstClr val="white"/>
-                </a:solidFill>
-                <a:effectLst/>
-                <a:uLnTx/>
-                <a:uFillTx/>
-                <a:latin typeface="Calibri"/>
-                <a:ea typeface="+mn-ea"/>
-                <a:cs typeface="+mn-cs"/>
-              </a:rPr>
-              <a:t/>
             </a:r>
             <a:br>
               <a:rPr kumimoji="0" lang="it-IT" sz="900" b="0" i="0" u="none" strike="noStrike" kern="0" cap="none" spc="0" normalizeH="0" baseline="0" noProof="0" dirty="0">
@@ -13564,23 +12918,6 @@
               </a:rPr>
               <a:t>IOModule</a:t>
             </a:r>
-            <a:r>
-              <a:rPr kumimoji="0" lang="it-IT" sz="900" b="0" i="0" u="none" strike="noStrike" kern="0" cap="none" spc="0" normalizeH="0" baseline="0" noProof="0" dirty="0">
-                <a:ln>
-                  <a:noFill/>
-                </a:ln>
-                <a:solidFill>
-                  <a:prstClr val="white"/>
-                </a:solidFill>
-                <a:effectLst/>
-                <a:uLnTx/>
-                <a:uFillTx/>
-                <a:latin typeface="Calibri"/>
-                <a:ea typeface="+mn-ea"/>
-                <a:cs typeface="+mn-cs"/>
-              </a:rPr>
-              <a:t/>
-            </a:r>
             <a:br>
               <a:rPr kumimoji="0" lang="it-IT" sz="900" b="0" i="0" u="none" strike="noStrike" kern="0" cap="none" spc="0" normalizeH="0" baseline="0" noProof="0" dirty="0">
                 <a:ln>
@@ -13778,6 +13115,548 @@
     <p:extLst>
       <p:ext uri="{BB962C8B-B14F-4D97-AF65-F5344CB8AC3E}">
         <p14:creationId xmlns:p14="http://schemas.microsoft.com/office/powerpoint/2010/main" val="123496346"/>
+      </p:ext>
+    </p:extLst>
+  </p:cSld>
+  <p:clrMapOvr>
+    <a:masterClrMapping/>
+  </p:clrMapOvr>
+</p:sld>
+</file>
+
+<file path=ppt/slides/slide4.xml><?xml version="1.0" encoding="utf-8"?>
+<p:sld xmlns:a="http://schemas.openxmlformats.org/drawingml/2006/main" xmlns:r="http://schemas.openxmlformats.org/officeDocument/2006/relationships" xmlns:p="http://schemas.openxmlformats.org/presentationml/2006/main">
+  <p:cSld>
+    <p:spTree>
+      <p:nvGrpSpPr>
+        <p:cNvPr id="1" name=""/>
+        <p:cNvGrpSpPr/>
+        <p:nvPr/>
+      </p:nvGrpSpPr>
+      <p:grpSpPr>
+        <a:xfrm>
+          <a:off x="0" y="0"/>
+          <a:ext cx="0" cy="0"/>
+          <a:chOff x="0" y="0"/>
+          <a:chExt cx="0" cy="0"/>
+        </a:xfrm>
+      </p:grpSpPr>
+      <p:sp>
+        <p:nvSpPr>
+          <p:cNvPr id="2" name="Rectangle 1"/>
+          <p:cNvSpPr/>
+          <p:nvPr/>
+        </p:nvSpPr>
+        <p:spPr>
+          <a:xfrm>
+            <a:off x="4655840" y="1484784"/>
+            <a:ext cx="1512168" cy="648072"/>
+          </a:xfrm>
+          <a:prstGeom prst="rect">
+            <a:avLst/>
+          </a:prstGeom>
+        </p:spPr>
+        <p:style>
+          <a:lnRef idx="2">
+            <a:schemeClr val="accent1">
+              <a:shade val="50000"/>
+            </a:schemeClr>
+          </a:lnRef>
+          <a:fillRef idx="1">
+            <a:schemeClr val="accent1"/>
+          </a:fillRef>
+          <a:effectRef idx="0">
+            <a:schemeClr val="accent1"/>
+          </a:effectRef>
+          <a:fontRef idx="minor">
+            <a:schemeClr val="lt1"/>
+          </a:fontRef>
+        </p:style>
+        <p:txBody>
+          <a:bodyPr rtlCol="0" anchor="ctr"/>
+          <a:lstStyle/>
+          <a:p>
+            <a:pPr algn="ctr"/>
+            <a:r>
+              <a:rPr lang="en-US" dirty="0" err="1"/>
+              <a:t>eBPF</a:t>
+            </a:r>
+            <a:r>
+              <a:rPr lang="en-US" dirty="0"/>
+              <a:t> DHCP Server</a:t>
+            </a:r>
+          </a:p>
+        </p:txBody>
+      </p:sp>
+      <p:sp>
+        <p:nvSpPr>
+          <p:cNvPr id="3" name="Rectangle 2"/>
+          <p:cNvSpPr/>
+          <p:nvPr/>
+        </p:nvSpPr>
+        <p:spPr>
+          <a:xfrm>
+            <a:off x="2063552" y="1484784"/>
+            <a:ext cx="1512168" cy="648072"/>
+          </a:xfrm>
+          <a:prstGeom prst="rect">
+            <a:avLst/>
+          </a:prstGeom>
+        </p:spPr>
+        <p:style>
+          <a:lnRef idx="2">
+            <a:schemeClr val="accent1">
+              <a:shade val="50000"/>
+            </a:schemeClr>
+          </a:lnRef>
+          <a:fillRef idx="1">
+            <a:schemeClr val="accent1"/>
+          </a:fillRef>
+          <a:effectRef idx="0">
+            <a:schemeClr val="accent1"/>
+          </a:effectRef>
+          <a:fontRef idx="minor">
+            <a:schemeClr val="lt1"/>
+          </a:fontRef>
+        </p:style>
+        <p:txBody>
+          <a:bodyPr rtlCol="0" anchor="ctr"/>
+          <a:lstStyle/>
+          <a:p>
+            <a:pPr algn="ctr"/>
+            <a:r>
+              <a:rPr lang="en-US" dirty="0" err="1"/>
+              <a:t>eBPF</a:t>
+            </a:r>
+            <a:r>
+              <a:rPr lang="en-US" dirty="0"/>
+              <a:t> Switch Module</a:t>
+            </a:r>
+          </a:p>
+        </p:txBody>
+      </p:sp>
+      <p:cxnSp>
+        <p:nvCxnSpPr>
+          <p:cNvPr id="5" name="Straight Arrow Connector 4"/>
+          <p:cNvCxnSpPr>
+            <a:stCxn id="3" idx="3"/>
+            <a:endCxn id="2" idx="1"/>
+          </p:cNvCxnSpPr>
+          <p:nvPr/>
+        </p:nvCxnSpPr>
+        <p:spPr>
+          <a:xfrm>
+            <a:off x="3575720" y="1808820"/>
+            <a:ext cx="1080120" cy="0"/>
+          </a:xfrm>
+          <a:prstGeom prst="straightConnector1">
+            <a:avLst/>
+          </a:prstGeom>
+          <a:ln>
+            <a:headEnd type="triangle"/>
+            <a:tailEnd type="triangle"/>
+          </a:ln>
+        </p:spPr>
+        <p:style>
+          <a:lnRef idx="1">
+            <a:schemeClr val="dk1"/>
+          </a:lnRef>
+          <a:fillRef idx="0">
+            <a:schemeClr val="dk1"/>
+          </a:fillRef>
+          <a:effectRef idx="0">
+            <a:schemeClr val="dk1"/>
+          </a:effectRef>
+          <a:fontRef idx="minor">
+            <a:schemeClr val="tx1"/>
+          </a:fontRef>
+        </p:style>
+      </p:cxnSp>
+      <p:sp>
+        <p:nvSpPr>
+          <p:cNvPr id="6" name="Rectangle 5"/>
+          <p:cNvSpPr/>
+          <p:nvPr/>
+        </p:nvSpPr>
+        <p:spPr>
+          <a:xfrm>
+            <a:off x="335360" y="3284984"/>
+            <a:ext cx="1368152" cy="432048"/>
+          </a:xfrm>
+          <a:prstGeom prst="rect">
+            <a:avLst/>
+          </a:prstGeom>
+        </p:spPr>
+        <p:style>
+          <a:lnRef idx="0">
+            <a:schemeClr val="accent2"/>
+          </a:lnRef>
+          <a:fillRef idx="3">
+            <a:schemeClr val="accent2"/>
+          </a:fillRef>
+          <a:effectRef idx="3">
+            <a:schemeClr val="accent2"/>
+          </a:effectRef>
+          <a:fontRef idx="minor">
+            <a:schemeClr val="lt1"/>
+          </a:fontRef>
+        </p:style>
+        <p:txBody>
+          <a:bodyPr rtlCol="0" anchor="ctr"/>
+          <a:lstStyle/>
+          <a:p>
+            <a:pPr algn="ctr"/>
+            <a:r>
+              <a:rPr lang="en-US" dirty="0"/>
+              <a:t>veth1_</a:t>
+            </a:r>
+          </a:p>
+        </p:txBody>
+      </p:sp>
+      <p:sp>
+        <p:nvSpPr>
+          <p:cNvPr id="7" name="Rectangle 6"/>
+          <p:cNvSpPr/>
+          <p:nvPr/>
+        </p:nvSpPr>
+        <p:spPr>
+          <a:xfrm>
+            <a:off x="2135560" y="3284984"/>
+            <a:ext cx="1368152" cy="432048"/>
+          </a:xfrm>
+          <a:prstGeom prst="rect">
+            <a:avLst/>
+          </a:prstGeom>
+        </p:spPr>
+        <p:style>
+          <a:lnRef idx="0">
+            <a:schemeClr val="accent2"/>
+          </a:lnRef>
+          <a:fillRef idx="3">
+            <a:schemeClr val="accent2"/>
+          </a:fillRef>
+          <a:effectRef idx="3">
+            <a:schemeClr val="accent2"/>
+          </a:effectRef>
+          <a:fontRef idx="minor">
+            <a:schemeClr val="lt1"/>
+          </a:fontRef>
+        </p:style>
+        <p:txBody>
+          <a:bodyPr rtlCol="0" anchor="ctr"/>
+          <a:lstStyle/>
+          <a:p>
+            <a:pPr algn="ctr"/>
+            <a:r>
+              <a:rPr lang="en-US" dirty="0"/>
+              <a:t>veth2_</a:t>
+            </a:r>
+          </a:p>
+        </p:txBody>
+      </p:sp>
+      <p:sp>
+        <p:nvSpPr>
+          <p:cNvPr id="8" name="Rectangle 7"/>
+          <p:cNvSpPr/>
+          <p:nvPr/>
+        </p:nvSpPr>
+        <p:spPr>
+          <a:xfrm>
+            <a:off x="3935760" y="3284984"/>
+            <a:ext cx="1368152" cy="432048"/>
+          </a:xfrm>
+          <a:prstGeom prst="rect">
+            <a:avLst/>
+          </a:prstGeom>
+        </p:spPr>
+        <p:style>
+          <a:lnRef idx="0">
+            <a:schemeClr val="accent2"/>
+          </a:lnRef>
+          <a:fillRef idx="3">
+            <a:schemeClr val="accent2"/>
+          </a:fillRef>
+          <a:effectRef idx="3">
+            <a:schemeClr val="accent2"/>
+          </a:effectRef>
+          <a:fontRef idx="minor">
+            <a:schemeClr val="lt1"/>
+          </a:fontRef>
+        </p:style>
+        <p:txBody>
+          <a:bodyPr rtlCol="0" anchor="ctr"/>
+          <a:lstStyle/>
+          <a:p>
+            <a:pPr algn="ctr"/>
+            <a:r>
+              <a:rPr lang="en-US" dirty="0"/>
+              <a:t>veth3_</a:t>
+            </a:r>
+          </a:p>
+        </p:txBody>
+      </p:sp>
+      <p:cxnSp>
+        <p:nvCxnSpPr>
+          <p:cNvPr id="10" name="Straight Arrow Connector 9"/>
+          <p:cNvCxnSpPr>
+            <a:cxnSpLocks/>
+            <a:stCxn id="3" idx="2"/>
+            <a:endCxn id="6" idx="0"/>
+          </p:cNvCxnSpPr>
+          <p:nvPr/>
+        </p:nvCxnSpPr>
+        <p:spPr>
+          <a:xfrm flipH="1">
+            <a:off x="1019436" y="2132856"/>
+            <a:ext cx="1800200" cy="1152128"/>
+          </a:xfrm>
+          <a:prstGeom prst="straightConnector1">
+            <a:avLst/>
+          </a:prstGeom>
+          <a:ln>
+            <a:headEnd type="triangle"/>
+            <a:tailEnd type="triangle"/>
+          </a:ln>
+        </p:spPr>
+        <p:style>
+          <a:lnRef idx="1">
+            <a:schemeClr val="dk1"/>
+          </a:lnRef>
+          <a:fillRef idx="0">
+            <a:schemeClr val="dk1"/>
+          </a:fillRef>
+          <a:effectRef idx="0">
+            <a:schemeClr val="dk1"/>
+          </a:effectRef>
+          <a:fontRef idx="minor">
+            <a:schemeClr val="tx1"/>
+          </a:fontRef>
+        </p:style>
+      </p:cxnSp>
+      <p:cxnSp>
+        <p:nvCxnSpPr>
+          <p:cNvPr id="13" name="Straight Arrow Connector 12"/>
+          <p:cNvCxnSpPr>
+            <a:cxnSpLocks/>
+            <a:stCxn id="3" idx="2"/>
+            <a:endCxn id="7" idx="0"/>
+          </p:cNvCxnSpPr>
+          <p:nvPr/>
+        </p:nvCxnSpPr>
+        <p:spPr>
+          <a:xfrm>
+            <a:off x="2819636" y="2132856"/>
+            <a:ext cx="0" cy="1152128"/>
+          </a:xfrm>
+          <a:prstGeom prst="straightConnector1">
+            <a:avLst/>
+          </a:prstGeom>
+          <a:ln>
+            <a:headEnd type="triangle"/>
+            <a:tailEnd type="triangle"/>
+          </a:ln>
+        </p:spPr>
+        <p:style>
+          <a:lnRef idx="1">
+            <a:schemeClr val="dk1"/>
+          </a:lnRef>
+          <a:fillRef idx="0">
+            <a:schemeClr val="dk1"/>
+          </a:fillRef>
+          <a:effectRef idx="0">
+            <a:schemeClr val="dk1"/>
+          </a:effectRef>
+          <a:fontRef idx="minor">
+            <a:schemeClr val="tx1"/>
+          </a:fontRef>
+        </p:style>
+      </p:cxnSp>
+      <p:cxnSp>
+        <p:nvCxnSpPr>
+          <p:cNvPr id="17" name="Straight Arrow Connector 16"/>
+          <p:cNvCxnSpPr>
+            <a:cxnSpLocks/>
+            <a:stCxn id="3" idx="2"/>
+            <a:endCxn id="8" idx="0"/>
+          </p:cNvCxnSpPr>
+          <p:nvPr/>
+        </p:nvCxnSpPr>
+        <p:spPr>
+          <a:xfrm>
+            <a:off x="2819636" y="2132856"/>
+            <a:ext cx="1800200" cy="1152128"/>
+          </a:xfrm>
+          <a:prstGeom prst="straightConnector1">
+            <a:avLst/>
+          </a:prstGeom>
+          <a:ln>
+            <a:headEnd type="triangle"/>
+            <a:tailEnd type="triangle"/>
+          </a:ln>
+        </p:spPr>
+        <p:style>
+          <a:lnRef idx="1">
+            <a:schemeClr val="dk1"/>
+          </a:lnRef>
+          <a:fillRef idx="0">
+            <a:schemeClr val="dk1"/>
+          </a:fillRef>
+          <a:effectRef idx="0">
+            <a:schemeClr val="dk1"/>
+          </a:effectRef>
+          <a:fontRef idx="minor">
+            <a:schemeClr val="tx1"/>
+          </a:fontRef>
+        </p:style>
+      </p:cxnSp>
+      <p:sp>
+        <p:nvSpPr>
+          <p:cNvPr id="20" name="Rectangle 19"/>
+          <p:cNvSpPr/>
+          <p:nvPr/>
+        </p:nvSpPr>
+        <p:spPr>
+          <a:xfrm>
+            <a:off x="227349" y="3140968"/>
+            <a:ext cx="1620179" cy="936104"/>
+          </a:xfrm>
+          <a:prstGeom prst="rect">
+            <a:avLst/>
+          </a:prstGeom>
+          <a:noFill/>
+        </p:spPr>
+        <p:style>
+          <a:lnRef idx="2">
+            <a:schemeClr val="accent1">
+              <a:shade val="50000"/>
+            </a:schemeClr>
+          </a:lnRef>
+          <a:fillRef idx="1">
+            <a:schemeClr val="accent1"/>
+          </a:fillRef>
+          <a:effectRef idx="0">
+            <a:schemeClr val="accent1"/>
+          </a:effectRef>
+          <a:fontRef idx="minor">
+            <a:schemeClr val="lt1"/>
+          </a:fontRef>
+        </p:style>
+        <p:txBody>
+          <a:bodyPr rtlCol="0" anchor="b"/>
+          <a:lstStyle/>
+          <a:p>
+            <a:pPr algn="ctr"/>
+            <a:r>
+              <a:rPr lang="en-US" dirty="0">
+                <a:solidFill>
+                  <a:schemeClr val="tx1"/>
+                </a:solidFill>
+              </a:rPr>
+              <a:t>ns1</a:t>
+            </a:r>
+          </a:p>
+        </p:txBody>
+      </p:sp>
+      <p:sp>
+        <p:nvSpPr>
+          <p:cNvPr id="21" name="Rectangle 20"/>
+          <p:cNvSpPr/>
+          <p:nvPr/>
+        </p:nvSpPr>
+        <p:spPr>
+          <a:xfrm>
+            <a:off x="1967252" y="3140968"/>
+            <a:ext cx="1620179" cy="936104"/>
+          </a:xfrm>
+          <a:prstGeom prst="rect">
+            <a:avLst/>
+          </a:prstGeom>
+          <a:noFill/>
+        </p:spPr>
+        <p:style>
+          <a:lnRef idx="2">
+            <a:schemeClr val="accent1">
+              <a:shade val="50000"/>
+            </a:schemeClr>
+          </a:lnRef>
+          <a:fillRef idx="1">
+            <a:schemeClr val="accent1"/>
+          </a:fillRef>
+          <a:effectRef idx="0">
+            <a:schemeClr val="accent1"/>
+          </a:effectRef>
+          <a:fontRef idx="minor">
+            <a:schemeClr val="lt1"/>
+          </a:fontRef>
+        </p:style>
+        <p:txBody>
+          <a:bodyPr rtlCol="0" anchor="b"/>
+          <a:lstStyle/>
+          <a:p>
+            <a:pPr algn="ctr"/>
+            <a:r>
+              <a:rPr lang="en-US" dirty="0">
+                <a:solidFill>
+                  <a:schemeClr val="tx1"/>
+                </a:solidFill>
+              </a:rPr>
+              <a:t>ns2</a:t>
+            </a:r>
+          </a:p>
+        </p:txBody>
+      </p:sp>
+      <p:sp>
+        <p:nvSpPr>
+          <p:cNvPr id="22" name="Rectangle 21"/>
+          <p:cNvSpPr/>
+          <p:nvPr/>
+        </p:nvSpPr>
+        <p:spPr>
+          <a:xfrm>
+            <a:off x="3767452" y="3140967"/>
+            <a:ext cx="1620179" cy="936104"/>
+          </a:xfrm>
+          <a:prstGeom prst="rect">
+            <a:avLst/>
+          </a:prstGeom>
+          <a:noFill/>
+        </p:spPr>
+        <p:style>
+          <a:lnRef idx="2">
+            <a:schemeClr val="accent1">
+              <a:shade val="50000"/>
+            </a:schemeClr>
+          </a:lnRef>
+          <a:fillRef idx="1">
+            <a:schemeClr val="accent1"/>
+          </a:fillRef>
+          <a:effectRef idx="0">
+            <a:schemeClr val="accent1"/>
+          </a:effectRef>
+          <a:fontRef idx="minor">
+            <a:schemeClr val="lt1"/>
+          </a:fontRef>
+        </p:style>
+        <p:txBody>
+          <a:bodyPr rtlCol="0" anchor="b"/>
+          <a:lstStyle/>
+          <a:p>
+            <a:pPr algn="ctr"/>
+            <a:r>
+              <a:rPr lang="en-US" dirty="0">
+                <a:solidFill>
+                  <a:schemeClr val="tx1"/>
+                </a:solidFill>
+              </a:rPr>
+              <a:t>ns3</a:t>
+            </a:r>
+          </a:p>
+        </p:txBody>
+      </p:sp>
+    </p:spTree>
+    <p:extLst>
+      <p:ext uri="{BB962C8B-B14F-4D97-AF65-F5344CB8AC3E}">
+        <p14:creationId xmlns:p14="http://schemas.microsoft.com/office/powerpoint/2010/main" val="102732344"/>
       </p:ext>
     </p:extLst>
   </p:cSld>

</xml_diff>